<commit_message>
add draft CP_pythagorean & figs
</commit_message>
<xml_diff>
--- a/spring15/slidesS15/6042S14welcome.pptx
+++ b/spring15/slidesS15/6042S14welcome.pptx
@@ -6334,7 +6334,7 @@
           <a:graphicData uri="http://schemas.openxmlformats.org/presentationml/2006/ole">
             <mc:AlternateContent xmlns:mc="http://schemas.openxmlformats.org/markup-compatibility/2006">
               <mc:Choice xmlns:v="urn:schemas-microsoft-com:vml" Requires="v">
-                <p:oleObj spid="_x0000_s1161" name="Equation" r:id="rId4" imgW="914400" imgH="215640" progId="Equation.3">
+                <p:oleObj spid="_x0000_s1168" name="Equation" r:id="rId4" imgW="914400" imgH="215640" progId="Equation.3">
                   <p:embed/>
                 </p:oleObj>
               </mc:Choice>
@@ -6404,7 +6404,7 @@
           <a:graphicData uri="http://schemas.openxmlformats.org/presentationml/2006/ole">
             <mc:AlternateContent xmlns:mc="http://schemas.openxmlformats.org/markup-compatibility/2006">
               <mc:Choice xmlns:v="urn:schemas-microsoft-com:vml" Requires="v">
-                <p:oleObj spid="_x0000_s1162" name="Equation" r:id="rId6" imgW="914400" imgH="215640" progId="Equation.3">
+                <p:oleObj spid="_x0000_s1169" name="Equation" r:id="rId6" imgW="914400" imgH="215640" progId="Equation.3">
                   <p:embed/>
                 </p:oleObj>
               </mc:Choice>
@@ -10005,7 +10005,7 @@
           <a:graphicData uri="http://schemas.openxmlformats.org/presentationml/2006/ole">
             <mc:AlternateContent xmlns:mc="http://schemas.openxmlformats.org/markup-compatibility/2006">
               <mc:Choice xmlns:v="urn:schemas-microsoft-com:vml" Requires="v">
-                <p:oleObj spid="_x0000_s150607" name="Equation" r:id="rId4" imgW="838200" imgH="241300" progId="Equation.DSMT4">
+                <p:oleObj spid="_x0000_s150611" name="Equation" r:id="rId4" imgW="838200" imgH="241300" progId="Equation.DSMT4">
                   <p:embed/>
                 </p:oleObj>
               </mc:Choice>
@@ -10446,360 +10446,6 @@
       </p:sp>
       <p:sp>
         <p:nvSpPr>
-          <p:cNvPr id="6150" name="Text Box 129"/>
-          <p:cNvSpPr txBox="1">
-            <a:spLocks noChangeArrowheads="1"/>
-          </p:cNvSpPr>
-          <p:nvPr/>
-        </p:nvSpPr>
-        <p:spPr bwMode="auto">
-          <a:xfrm>
-            <a:off x="1535113" y="2409825"/>
-            <a:ext cx="368300" cy="523875"/>
-          </a:xfrm>
-          <a:prstGeom prst="rect">
-            <a:avLst/>
-          </a:prstGeom>
-          <a:noFill/>
-          <a:ln w="9525">
-            <a:noFill/>
-            <a:miter lim="800000"/>
-            <a:headEnd/>
-            <a:tailEnd/>
-          </a:ln>
-        </p:spPr>
-        <p:txBody>
-          <a:bodyPr wrap="none">
-            <a:spAutoFit/>
-          </a:bodyPr>
-          <a:lstStyle/>
-          <a:p>
-            <a:r>
-              <a:rPr lang="en-US" sz="2800" b="1">
-                <a:latin typeface="Comic Sans MS" pitchFamily="66" charset="0"/>
-              </a:rPr>
-              <a:t>c</a:t>
-            </a:r>
-          </a:p>
-        </p:txBody>
-      </p:sp>
-      <p:sp>
-        <p:nvSpPr>
-          <p:cNvPr id="6151" name="Text Box 130"/>
-          <p:cNvSpPr txBox="1">
-            <a:spLocks noChangeArrowheads="1"/>
-          </p:cNvSpPr>
-          <p:nvPr/>
-        </p:nvSpPr>
-        <p:spPr bwMode="auto">
-          <a:xfrm>
-            <a:off x="457200" y="2438400"/>
-            <a:ext cx="387350" cy="519113"/>
-          </a:xfrm>
-          <a:prstGeom prst="rect">
-            <a:avLst/>
-          </a:prstGeom>
-          <a:noFill/>
-          <a:ln w="9525">
-            <a:noFill/>
-            <a:miter lim="800000"/>
-            <a:headEnd/>
-            <a:tailEnd/>
-          </a:ln>
-        </p:spPr>
-        <p:txBody>
-          <a:bodyPr>
-            <a:spAutoFit/>
-          </a:bodyPr>
-          <a:lstStyle/>
-          <a:p>
-            <a:r>
-              <a:rPr lang="en-US" sz="2800" b="1">
-                <a:latin typeface="Comic Sans MS" pitchFamily="66" charset="0"/>
-              </a:rPr>
-              <a:t>b</a:t>
-            </a:r>
-          </a:p>
-        </p:txBody>
-      </p:sp>
-      <p:sp>
-        <p:nvSpPr>
-          <p:cNvPr id="6152" name="Text Box 132"/>
-          <p:cNvSpPr txBox="1">
-            <a:spLocks noChangeArrowheads="1"/>
-          </p:cNvSpPr>
-          <p:nvPr/>
-        </p:nvSpPr>
-        <p:spPr bwMode="auto">
-          <a:xfrm>
-            <a:off x="1238250" y="3568700"/>
-            <a:ext cx="384175" cy="523875"/>
-          </a:xfrm>
-          <a:prstGeom prst="rect">
-            <a:avLst/>
-          </a:prstGeom>
-          <a:noFill/>
-          <a:ln w="9525">
-            <a:noFill/>
-            <a:miter lim="800000"/>
-            <a:headEnd/>
-            <a:tailEnd type="none" w="lg" len="lg"/>
-          </a:ln>
-        </p:spPr>
-        <p:txBody>
-          <a:bodyPr wrap="none">
-            <a:spAutoFit/>
-          </a:bodyPr>
-          <a:lstStyle/>
-          <a:p>
-            <a:r>
-              <a:rPr lang="en-US" sz="2800" b="1">
-                <a:latin typeface="Comic Sans MS" pitchFamily="66" charset="0"/>
-              </a:rPr>
-              <a:t>a</a:t>
-            </a:r>
-          </a:p>
-        </p:txBody>
-      </p:sp>
-      <p:sp>
-        <p:nvSpPr>
-          <p:cNvPr id="6153" name="AutoShape 131"/>
-          <p:cNvSpPr>
-            <a:spLocks noChangeArrowheads="1"/>
-          </p:cNvSpPr>
-          <p:nvPr/>
-        </p:nvSpPr>
-        <p:spPr bwMode="auto">
-          <a:xfrm>
-            <a:off x="914400" y="1600200"/>
-            <a:ext cx="1096963" cy="2057400"/>
-          </a:xfrm>
-          <a:prstGeom prst="rtTriangle">
-            <a:avLst/>
-          </a:prstGeom>
-          <a:solidFill>
-            <a:schemeClr val="folHlink"/>
-          </a:solidFill>
-          <a:ln w="9525">
-            <a:solidFill>
-              <a:schemeClr val="tx1"/>
-            </a:solidFill>
-            <a:miter lim="800000"/>
-            <a:headEnd/>
-            <a:tailEnd/>
-          </a:ln>
-        </p:spPr>
-        <p:txBody>
-          <a:bodyPr wrap="none" anchor="ctr"/>
-          <a:lstStyle/>
-          <a:p>
-            <a:endParaRPr lang="en-US">
-              <a:latin typeface="Comic Sans MS" pitchFamily="66" charset="0"/>
-            </a:endParaRPr>
-          </a:p>
-        </p:txBody>
-      </p:sp>
-      <p:grpSp>
-        <p:nvGrpSpPr>
-          <p:cNvPr id="6154" name="Group 182"/>
-          <p:cNvGrpSpPr>
-            <a:grpSpLocks/>
-          </p:cNvGrpSpPr>
-          <p:nvPr/>
-        </p:nvGrpSpPr>
-        <p:grpSpPr bwMode="auto">
-          <a:xfrm>
-            <a:off x="906463" y="3460750"/>
-            <a:ext cx="193675" cy="190500"/>
-            <a:chOff x="576" y="2170"/>
-            <a:chExt cx="122" cy="120"/>
-          </a:xfrm>
-        </p:grpSpPr>
-        <p:sp>
-          <p:nvSpPr>
-            <p:cNvPr id="6164" name="Line 134"/>
-            <p:cNvSpPr>
-              <a:spLocks noChangeShapeType="1"/>
-            </p:cNvSpPr>
-            <p:nvPr/>
-          </p:nvSpPr>
-          <p:spPr bwMode="auto">
-            <a:xfrm flipV="1">
-              <a:off x="576" y="2170"/>
-              <a:ext cx="122" cy="0"/>
-            </a:xfrm>
-            <a:prstGeom prst="line">
-              <a:avLst/>
-            </a:prstGeom>
-            <a:noFill/>
-            <a:ln w="19050">
-              <a:solidFill>
-                <a:schemeClr val="tx1"/>
-              </a:solidFill>
-              <a:round/>
-              <a:headEnd/>
-              <a:tailEnd/>
-            </a:ln>
-          </p:spPr>
-          <p:txBody>
-            <a:bodyPr/>
-            <a:lstStyle/>
-            <a:p>
-              <a:endParaRPr lang="en-US"/>
-            </a:p>
-          </p:txBody>
-        </p:sp>
-        <p:sp>
-          <p:nvSpPr>
-            <p:cNvPr id="6165" name="Line 135"/>
-            <p:cNvSpPr>
-              <a:spLocks noChangeShapeType="1"/>
-            </p:cNvSpPr>
-            <p:nvPr/>
-          </p:nvSpPr>
-          <p:spPr bwMode="auto">
-            <a:xfrm>
-              <a:off x="695" y="2175"/>
-              <a:ext cx="0" cy="115"/>
-            </a:xfrm>
-            <a:prstGeom prst="line">
-              <a:avLst/>
-            </a:prstGeom>
-            <a:noFill/>
-            <a:ln w="19050">
-              <a:solidFill>
-                <a:schemeClr val="tx1"/>
-              </a:solidFill>
-              <a:round/>
-              <a:headEnd/>
-              <a:tailEnd/>
-            </a:ln>
-          </p:spPr>
-          <p:txBody>
-            <a:bodyPr/>
-            <a:lstStyle/>
-            <a:p>
-              <a:endParaRPr lang="en-US"/>
-            </a:p>
-          </p:txBody>
-        </p:sp>
-      </p:grpSp>
-      <p:sp>
-        <p:nvSpPr>
-          <p:cNvPr id="6155" name="AutoShape 149"/>
-          <p:cNvSpPr>
-            <a:spLocks noChangeArrowheads="1"/>
-          </p:cNvSpPr>
-          <p:nvPr/>
-        </p:nvSpPr>
-        <p:spPr bwMode="auto">
-          <a:xfrm>
-            <a:off x="5181600" y="1600200"/>
-            <a:ext cx="1096963" cy="2057400"/>
-          </a:xfrm>
-          <a:prstGeom prst="rtTriangle">
-            <a:avLst/>
-          </a:prstGeom>
-          <a:solidFill>
-            <a:schemeClr val="bg2"/>
-          </a:solidFill>
-          <a:ln w="9525">
-            <a:solidFill>
-              <a:schemeClr val="tx1"/>
-            </a:solidFill>
-            <a:miter lim="800000"/>
-            <a:headEnd/>
-            <a:tailEnd/>
-          </a:ln>
-        </p:spPr>
-        <p:txBody>
-          <a:bodyPr wrap="none" anchor="ctr"/>
-          <a:lstStyle/>
-          <a:p>
-            <a:endParaRPr lang="en-US">
-              <a:latin typeface="Comic Sans MS" pitchFamily="66" charset="0"/>
-            </a:endParaRPr>
-          </a:p>
-        </p:txBody>
-      </p:sp>
-      <p:sp>
-        <p:nvSpPr>
-          <p:cNvPr id="6156" name="AutoShape 150"/>
-          <p:cNvSpPr>
-            <a:spLocks noChangeArrowheads="1"/>
-          </p:cNvSpPr>
-          <p:nvPr/>
-        </p:nvSpPr>
-        <p:spPr bwMode="auto">
-          <a:xfrm>
-            <a:off x="2286000" y="1600200"/>
-            <a:ext cx="1096963" cy="2057400"/>
-          </a:xfrm>
-          <a:prstGeom prst="rtTriangle">
-            <a:avLst/>
-          </a:prstGeom>
-          <a:solidFill>
-            <a:schemeClr val="accent2"/>
-          </a:solidFill>
-          <a:ln w="9525">
-            <a:solidFill>
-              <a:schemeClr val="tx1"/>
-            </a:solidFill>
-            <a:miter lim="800000"/>
-            <a:headEnd/>
-            <a:tailEnd/>
-          </a:ln>
-        </p:spPr>
-        <p:txBody>
-          <a:bodyPr wrap="none" anchor="ctr"/>
-          <a:lstStyle/>
-          <a:p>
-            <a:endParaRPr lang="en-US">
-              <a:latin typeface="Comic Sans MS" pitchFamily="66" charset="0"/>
-            </a:endParaRPr>
-          </a:p>
-        </p:txBody>
-      </p:sp>
-      <p:sp>
-        <p:nvSpPr>
-          <p:cNvPr id="6157" name="AutoShape 152"/>
-          <p:cNvSpPr>
-            <a:spLocks noChangeArrowheads="1"/>
-          </p:cNvSpPr>
-          <p:nvPr/>
-        </p:nvSpPr>
-        <p:spPr bwMode="auto">
-          <a:xfrm>
-            <a:off x="3717925" y="1600200"/>
-            <a:ext cx="1096963" cy="2057400"/>
-          </a:xfrm>
-          <a:prstGeom prst="rtTriangle">
-            <a:avLst/>
-          </a:prstGeom>
-          <a:solidFill>
-            <a:srgbClr val="DDDDDD"/>
-          </a:solidFill>
-          <a:ln w="9525">
-            <a:solidFill>
-              <a:schemeClr val="tx1"/>
-            </a:solidFill>
-            <a:miter lim="800000"/>
-            <a:headEnd/>
-            <a:tailEnd/>
-          </a:ln>
-        </p:spPr>
-        <p:txBody>
-          <a:bodyPr wrap="none" anchor="ctr"/>
-          <a:lstStyle/>
-          <a:p>
-            <a:endParaRPr lang="en-US">
-              <a:latin typeface="Comic Sans MS" pitchFamily="66" charset="0"/>
-            </a:endParaRPr>
-          </a:p>
-        </p:txBody>
-      </p:sp>
-      <p:sp>
-        <p:nvSpPr>
           <p:cNvPr id="9376" name="Text Box 160"/>
           <p:cNvSpPr txBox="1">
             <a:spLocks noChangeArrowheads="1"/>
@@ -11020,7 +10666,7 @@
           <a:graphicData uri="http://schemas.openxmlformats.org/presentationml/2006/ole">
             <mc:AlternateContent xmlns:mc="http://schemas.openxmlformats.org/markup-compatibility/2006">
               <mc:Choice xmlns:v="urn:schemas-microsoft-com:vml" Requires="v">
-                <p:oleObj spid="_x0000_s6280" name="Equation" r:id="rId4" imgW="304560" imgH="139680" progId="Equation.DSMT4">
+                <p:oleObj spid="_x0000_s6287" name="Equation" r:id="rId4" imgW="304560" imgH="139680" progId="Equation.DSMT4">
                   <p:embed/>
                 </p:oleObj>
               </mc:Choice>
@@ -11090,7 +10736,7 @@
           <a:graphicData uri="http://schemas.openxmlformats.org/presentationml/2006/ole">
             <mc:AlternateContent xmlns:mc="http://schemas.openxmlformats.org/markup-compatibility/2006">
               <mc:Choice xmlns:v="urn:schemas-microsoft-com:vml" Requires="v">
-                <p:oleObj spid="_x0000_s6281" name="Equation" r:id="rId6" imgW="304560" imgH="139680" progId="Equation.DSMT4">
+                <p:oleObj spid="_x0000_s6288" name="Equation" r:id="rId6" imgW="304560" imgH="139680" progId="Equation.DSMT4">
                   <p:embed/>
                 </p:oleObj>
               </mc:Choice>
@@ -11146,23 +10792,144 @@
       </p:graphicFrame>
       <p:grpSp>
         <p:nvGrpSpPr>
-          <p:cNvPr id="6159" name="Group 188"/>
-          <p:cNvGrpSpPr>
-            <a:grpSpLocks/>
-          </p:cNvGrpSpPr>
+          <p:cNvPr id="2" name="Group 1"/>
+          <p:cNvGrpSpPr/>
           <p:nvPr/>
         </p:nvGrpSpPr>
-        <p:grpSpPr bwMode="auto">
+        <p:grpSpPr>
           <a:xfrm>
-            <a:off x="6705600" y="2667000"/>
-            <a:ext cx="960438" cy="960438"/>
-            <a:chOff x="4224" y="1680"/>
-            <a:chExt cx="605" cy="605"/>
+            <a:off x="457200" y="1600200"/>
+            <a:ext cx="7208838" cy="2492375"/>
+            <a:chOff x="457200" y="1600200"/>
+            <a:chExt cx="7208838" cy="2492375"/>
           </a:xfrm>
         </p:grpSpPr>
         <p:sp>
           <p:nvSpPr>
-            <p:cNvPr id="6160" name="Rectangle 159"/>
+            <p:cNvPr id="6150" name="Text Box 129"/>
+            <p:cNvSpPr txBox="1">
+              <a:spLocks noChangeArrowheads="1"/>
+            </p:cNvSpPr>
+            <p:nvPr/>
+          </p:nvSpPr>
+          <p:spPr bwMode="auto">
+            <a:xfrm>
+              <a:off x="1535113" y="2409825"/>
+              <a:ext cx="368300" cy="523875"/>
+            </a:xfrm>
+            <a:prstGeom prst="rect">
+              <a:avLst/>
+            </a:prstGeom>
+            <a:noFill/>
+            <a:ln w="9525">
+              <a:solidFill>
+                <a:srgbClr val="4F81BD"/>
+              </a:solidFill>
+              <a:miter lim="800000"/>
+              <a:headEnd/>
+              <a:tailEnd/>
+            </a:ln>
+          </p:spPr>
+          <p:txBody>
+            <a:bodyPr wrap="none">
+              <a:spAutoFit/>
+            </a:bodyPr>
+            <a:lstStyle/>
+            <a:p>
+              <a:r>
+                <a:rPr lang="en-US" sz="2800" b="1" dirty="0">
+                  <a:latin typeface="Comic Sans MS" pitchFamily="66" charset="0"/>
+                </a:rPr>
+                <a:t>c</a:t>
+              </a:r>
+            </a:p>
+          </p:txBody>
+        </p:sp>
+        <p:sp>
+          <p:nvSpPr>
+            <p:cNvPr id="6151" name="Text Box 130"/>
+            <p:cNvSpPr txBox="1">
+              <a:spLocks noChangeArrowheads="1"/>
+            </p:cNvSpPr>
+            <p:nvPr/>
+          </p:nvSpPr>
+          <p:spPr bwMode="auto">
+            <a:xfrm>
+              <a:off x="457200" y="2438400"/>
+              <a:ext cx="387350" cy="519113"/>
+            </a:xfrm>
+            <a:prstGeom prst="rect">
+              <a:avLst/>
+            </a:prstGeom>
+            <a:noFill/>
+            <a:ln w="9525">
+              <a:solidFill>
+                <a:srgbClr val="4F81BD"/>
+              </a:solidFill>
+              <a:miter lim="800000"/>
+              <a:headEnd/>
+              <a:tailEnd/>
+            </a:ln>
+          </p:spPr>
+          <p:txBody>
+            <a:bodyPr>
+              <a:spAutoFit/>
+            </a:bodyPr>
+            <a:lstStyle/>
+            <a:p>
+              <a:r>
+                <a:rPr lang="en-US" sz="2800" b="1" dirty="0">
+                  <a:latin typeface="Comic Sans MS" pitchFamily="66" charset="0"/>
+                </a:rPr>
+                <a:t>b</a:t>
+              </a:r>
+            </a:p>
+          </p:txBody>
+        </p:sp>
+        <p:sp>
+          <p:nvSpPr>
+            <p:cNvPr id="6152" name="Text Box 132"/>
+            <p:cNvSpPr txBox="1">
+              <a:spLocks noChangeArrowheads="1"/>
+            </p:cNvSpPr>
+            <p:nvPr/>
+          </p:nvSpPr>
+          <p:spPr bwMode="auto">
+            <a:xfrm>
+              <a:off x="1238250" y="3568700"/>
+              <a:ext cx="384175" cy="523875"/>
+            </a:xfrm>
+            <a:prstGeom prst="rect">
+              <a:avLst/>
+            </a:prstGeom>
+            <a:noFill/>
+            <a:ln w="9525">
+              <a:solidFill>
+                <a:srgbClr val="4F81BD"/>
+              </a:solidFill>
+              <a:miter lim="800000"/>
+              <a:headEnd/>
+              <a:tailEnd type="none" w="lg" len="lg"/>
+            </a:ln>
+          </p:spPr>
+          <p:txBody>
+            <a:bodyPr wrap="none">
+              <a:spAutoFit/>
+            </a:bodyPr>
+            <a:lstStyle/>
+            <a:p>
+              <a:r>
+                <a:rPr lang="en-US" sz="2800" b="1">
+                  <a:latin typeface="Comic Sans MS" pitchFamily="66" charset="0"/>
+                </a:rPr>
+                <a:t>a</a:t>
+              </a:r>
+            </a:p>
+          </p:txBody>
+        </p:sp>
+        <p:sp>
+          <p:nvSpPr>
+            <p:cNvPr id="6153" name="AutoShape 131"/>
             <p:cNvSpPr>
               <a:spLocks noChangeArrowheads="1"/>
             </p:cNvSpPr>
@@ -11170,22 +10937,22 @@
           </p:nvSpPr>
           <p:spPr bwMode="auto">
             <a:xfrm>
-              <a:off x="4224" y="1680"/>
-              <a:ext cx="605" cy="605"/>
+              <a:off x="914400" y="1600200"/>
+              <a:ext cx="1096963" cy="2057400"/>
             </a:xfrm>
-            <a:prstGeom prst="rect">
+            <a:prstGeom prst="rtTriangle">
               <a:avLst/>
             </a:prstGeom>
             <a:solidFill>
-              <a:srgbClr val="FFFF00"/>
+              <a:schemeClr val="folHlink"/>
             </a:solidFill>
             <a:ln w="9525">
               <a:solidFill>
-                <a:schemeClr val="tx1"/>
+                <a:srgbClr val="4F81BD"/>
               </a:solidFill>
               <a:miter lim="800000"/>
               <a:headEnd/>
-              <a:tailEnd type="none" w="lg" len="lg"/>
+              <a:tailEnd/>
             </a:ln>
           </p:spPr>
           <p:txBody>
@@ -11200,7 +10967,7 @@
         </p:sp>
         <p:grpSp>
           <p:nvGrpSpPr>
-            <p:cNvPr id="6161" name="Group 183"/>
+            <p:cNvPr id="6154" name="Group 182"/>
             <p:cNvGrpSpPr>
               <a:grpSpLocks/>
             </p:cNvGrpSpPr>
@@ -11208,15 +10975,15 @@
           </p:nvGrpSpPr>
           <p:grpSpPr bwMode="auto">
             <a:xfrm>
-              <a:off x="4225" y="2164"/>
-              <a:ext cx="122" cy="120"/>
+              <a:off x="906463" y="3460750"/>
+              <a:ext cx="193675" cy="190500"/>
               <a:chOff x="576" y="2170"/>
               <a:chExt cx="122" cy="120"/>
             </a:xfrm>
           </p:grpSpPr>
           <p:sp>
             <p:nvSpPr>
-              <p:cNvPr id="6162" name="Line 184"/>
+              <p:cNvPr id="6164" name="Line 134"/>
               <p:cNvSpPr>
                 <a:spLocks noChangeShapeType="1"/>
               </p:cNvSpPr>
@@ -11233,7 +11000,7 @@
               <a:noFill/>
               <a:ln w="19050">
                 <a:solidFill>
-                  <a:schemeClr val="tx1"/>
+                  <a:srgbClr val="4F81BD"/>
                 </a:solidFill>
                 <a:round/>
                 <a:headEnd/>
@@ -11250,7 +11017,7 @@
           </p:sp>
           <p:sp>
             <p:nvSpPr>
-              <p:cNvPr id="6163" name="Line 185"/>
+              <p:cNvPr id="6165" name="Line 135"/>
               <p:cNvSpPr>
                 <a:spLocks noChangeShapeType="1"/>
               </p:cNvSpPr>
@@ -11267,7 +11034,7 @@
               <a:noFill/>
               <a:ln w="19050">
                 <a:solidFill>
-                  <a:schemeClr val="tx1"/>
+                  <a:srgbClr val="4F81BD"/>
                 </a:solidFill>
                 <a:round/>
                 <a:headEnd/>
@@ -11282,6 +11049,260 @@
               </a:p>
             </p:txBody>
           </p:sp>
+        </p:grpSp>
+        <p:sp>
+          <p:nvSpPr>
+            <p:cNvPr id="6155" name="AutoShape 149"/>
+            <p:cNvSpPr>
+              <a:spLocks noChangeArrowheads="1"/>
+            </p:cNvSpPr>
+            <p:nvPr/>
+          </p:nvSpPr>
+          <p:spPr bwMode="auto">
+            <a:xfrm>
+              <a:off x="5181600" y="1600200"/>
+              <a:ext cx="1096963" cy="2057400"/>
+            </a:xfrm>
+            <a:prstGeom prst="rtTriangle">
+              <a:avLst/>
+            </a:prstGeom>
+            <a:solidFill>
+              <a:schemeClr val="bg2"/>
+            </a:solidFill>
+            <a:ln w="9525">
+              <a:solidFill>
+                <a:srgbClr val="4F81BD"/>
+              </a:solidFill>
+              <a:miter lim="800000"/>
+              <a:headEnd/>
+              <a:tailEnd/>
+            </a:ln>
+          </p:spPr>
+          <p:txBody>
+            <a:bodyPr wrap="none" anchor="ctr"/>
+            <a:lstStyle/>
+            <a:p>
+              <a:endParaRPr lang="en-US">
+                <a:latin typeface="Comic Sans MS" pitchFamily="66" charset="0"/>
+              </a:endParaRPr>
+            </a:p>
+          </p:txBody>
+        </p:sp>
+        <p:sp>
+          <p:nvSpPr>
+            <p:cNvPr id="6156" name="AutoShape 150"/>
+            <p:cNvSpPr>
+              <a:spLocks noChangeArrowheads="1"/>
+            </p:cNvSpPr>
+            <p:nvPr/>
+          </p:nvSpPr>
+          <p:spPr bwMode="auto">
+            <a:xfrm>
+              <a:off x="2286000" y="1600200"/>
+              <a:ext cx="1096963" cy="2057400"/>
+            </a:xfrm>
+            <a:prstGeom prst="rtTriangle">
+              <a:avLst/>
+            </a:prstGeom>
+            <a:solidFill>
+              <a:schemeClr val="accent2"/>
+            </a:solidFill>
+            <a:ln w="9525">
+              <a:solidFill>
+                <a:srgbClr val="4F81BD"/>
+              </a:solidFill>
+              <a:miter lim="800000"/>
+              <a:headEnd/>
+              <a:tailEnd/>
+            </a:ln>
+          </p:spPr>
+          <p:txBody>
+            <a:bodyPr wrap="none" anchor="ctr"/>
+            <a:lstStyle/>
+            <a:p>
+              <a:endParaRPr lang="en-US">
+                <a:latin typeface="Comic Sans MS" pitchFamily="66" charset="0"/>
+              </a:endParaRPr>
+            </a:p>
+          </p:txBody>
+        </p:sp>
+        <p:sp>
+          <p:nvSpPr>
+            <p:cNvPr id="6157" name="AutoShape 152"/>
+            <p:cNvSpPr>
+              <a:spLocks noChangeArrowheads="1"/>
+            </p:cNvSpPr>
+            <p:nvPr/>
+          </p:nvSpPr>
+          <p:spPr bwMode="auto">
+            <a:xfrm>
+              <a:off x="3717925" y="1600200"/>
+              <a:ext cx="1096963" cy="2057400"/>
+            </a:xfrm>
+            <a:prstGeom prst="rtTriangle">
+              <a:avLst/>
+            </a:prstGeom>
+            <a:solidFill>
+              <a:srgbClr val="DDDDDD"/>
+            </a:solidFill>
+            <a:ln w="9525">
+              <a:solidFill>
+                <a:srgbClr val="4F81BD"/>
+              </a:solidFill>
+              <a:miter lim="800000"/>
+              <a:headEnd/>
+              <a:tailEnd/>
+            </a:ln>
+          </p:spPr>
+          <p:txBody>
+            <a:bodyPr wrap="none" anchor="ctr"/>
+            <a:lstStyle/>
+            <a:p>
+              <a:endParaRPr lang="en-US">
+                <a:latin typeface="Comic Sans MS" pitchFamily="66" charset="0"/>
+              </a:endParaRPr>
+            </a:p>
+          </p:txBody>
+        </p:sp>
+        <p:grpSp>
+          <p:nvGrpSpPr>
+            <p:cNvPr id="6159" name="Group 188"/>
+            <p:cNvGrpSpPr>
+              <a:grpSpLocks/>
+            </p:cNvGrpSpPr>
+            <p:nvPr/>
+          </p:nvGrpSpPr>
+          <p:grpSpPr bwMode="auto">
+            <a:xfrm>
+              <a:off x="6705600" y="2667000"/>
+              <a:ext cx="960438" cy="960438"/>
+              <a:chOff x="4224" y="1680"/>
+              <a:chExt cx="605" cy="605"/>
+            </a:xfrm>
+          </p:grpSpPr>
+          <p:sp>
+            <p:nvSpPr>
+              <p:cNvPr id="6160" name="Rectangle 159"/>
+              <p:cNvSpPr>
+                <a:spLocks noChangeArrowheads="1"/>
+              </p:cNvSpPr>
+              <p:nvPr/>
+            </p:nvSpPr>
+            <p:spPr bwMode="auto">
+              <a:xfrm>
+                <a:off x="4224" y="1680"/>
+                <a:ext cx="605" cy="605"/>
+              </a:xfrm>
+              <a:prstGeom prst="rect">
+                <a:avLst/>
+              </a:prstGeom>
+              <a:solidFill>
+                <a:srgbClr val="FFFF00"/>
+              </a:solidFill>
+              <a:ln w="9525">
+                <a:solidFill>
+                  <a:srgbClr val="4F81BD"/>
+                </a:solidFill>
+                <a:miter lim="800000"/>
+                <a:headEnd/>
+                <a:tailEnd type="none" w="lg" len="lg"/>
+              </a:ln>
+            </p:spPr>
+            <p:txBody>
+              <a:bodyPr wrap="none" anchor="ctr"/>
+              <a:lstStyle/>
+              <a:p>
+                <a:endParaRPr lang="en-US">
+                  <a:latin typeface="Comic Sans MS" pitchFamily="66" charset="0"/>
+                </a:endParaRPr>
+              </a:p>
+            </p:txBody>
+          </p:sp>
+          <p:grpSp>
+            <p:nvGrpSpPr>
+              <p:cNvPr id="6161" name="Group 183"/>
+              <p:cNvGrpSpPr>
+                <a:grpSpLocks/>
+              </p:cNvGrpSpPr>
+              <p:nvPr/>
+            </p:nvGrpSpPr>
+            <p:grpSpPr bwMode="auto">
+              <a:xfrm>
+                <a:off x="4225" y="2164"/>
+                <a:ext cx="122" cy="120"/>
+                <a:chOff x="576" y="2170"/>
+                <a:chExt cx="122" cy="120"/>
+              </a:xfrm>
+            </p:grpSpPr>
+            <p:sp>
+              <p:nvSpPr>
+                <p:cNvPr id="6162" name="Line 184"/>
+                <p:cNvSpPr>
+                  <a:spLocks noChangeShapeType="1"/>
+                </p:cNvSpPr>
+                <p:nvPr/>
+              </p:nvSpPr>
+              <p:spPr bwMode="auto">
+                <a:xfrm flipV="1">
+                  <a:off x="576" y="2170"/>
+                  <a:ext cx="122" cy="0"/>
+                </a:xfrm>
+                <a:prstGeom prst="line">
+                  <a:avLst/>
+                </a:prstGeom>
+                <a:noFill/>
+                <a:ln w="19050">
+                  <a:solidFill>
+                    <a:srgbClr val="4F81BD"/>
+                  </a:solidFill>
+                  <a:round/>
+                  <a:headEnd/>
+                  <a:tailEnd/>
+                </a:ln>
+              </p:spPr>
+              <p:txBody>
+                <a:bodyPr/>
+                <a:lstStyle/>
+                <a:p>
+                  <a:endParaRPr lang="en-US"/>
+                </a:p>
+              </p:txBody>
+            </p:sp>
+            <p:sp>
+              <p:nvSpPr>
+                <p:cNvPr id="6163" name="Line 185"/>
+                <p:cNvSpPr>
+                  <a:spLocks noChangeShapeType="1"/>
+                </p:cNvSpPr>
+                <p:nvPr/>
+              </p:nvSpPr>
+              <p:spPr bwMode="auto">
+                <a:xfrm>
+                  <a:off x="695" y="2175"/>
+                  <a:ext cx="0" cy="115"/>
+                </a:xfrm>
+                <a:prstGeom prst="line">
+                  <a:avLst/>
+                </a:prstGeom>
+                <a:noFill/>
+                <a:ln w="19050">
+                  <a:solidFill>
+                    <a:srgbClr val="4F81BD"/>
+                  </a:solidFill>
+                  <a:round/>
+                  <a:headEnd/>
+                  <a:tailEnd/>
+                </a:ln>
+              </p:spPr>
+              <p:txBody>
+                <a:bodyPr/>
+                <a:lstStyle/>
+                <a:p>
+                  <a:endParaRPr lang="en-US"/>
+                </a:p>
+              </p:txBody>
+            </p:sp>
+          </p:grpSp>
         </p:grpSp>
       </p:grpSp>
     </p:spTree>
@@ -11585,482 +11606,542 @@
           </a:p>
         </p:txBody>
       </p:sp>
-      <p:sp>
-        <p:nvSpPr>
-          <p:cNvPr id="28676" name="AutoShape 7"/>
-          <p:cNvSpPr>
-            <a:spLocks noChangeArrowheads="1"/>
-          </p:cNvSpPr>
+      <p:grpSp>
+        <p:nvGrpSpPr>
+          <p:cNvPr id="5" name="Group 4"/>
+          <p:cNvGrpSpPr/>
           <p:nvPr/>
-        </p:nvSpPr>
-        <p:spPr bwMode="auto">
-          <a:xfrm rot="1768937">
-            <a:off x="5443538" y="1833563"/>
-            <a:ext cx="1720850" cy="3005137"/>
+        </p:nvGrpSpPr>
+        <p:grpSpPr>
+          <a:xfrm>
+            <a:off x="1993900" y="838200"/>
+            <a:ext cx="5157788" cy="5200650"/>
+            <a:chOff x="2006600" y="774700"/>
+            <a:chExt cx="5157788" cy="5200650"/>
           </a:xfrm>
-          <a:prstGeom prst="rtTriangle">
-            <a:avLst/>
-          </a:prstGeom>
-          <a:solidFill>
-            <a:schemeClr val="bg2"/>
-          </a:solidFill>
-          <a:ln w="9525">
+        </p:grpSpPr>
+        <p:grpSp>
+          <p:nvGrpSpPr>
+            <p:cNvPr id="4" name="Group 3"/>
+            <p:cNvGrpSpPr/>
+            <p:nvPr/>
+          </p:nvGrpSpPr>
+          <p:grpSpPr>
+            <a:xfrm>
+              <a:off x="2006600" y="774700"/>
+              <a:ext cx="5157788" cy="4344988"/>
+              <a:chOff x="1993900" y="774700"/>
+              <a:chExt cx="5157788" cy="4344988"/>
+            </a:xfrm>
+          </p:grpSpPr>
+          <p:sp>
+            <p:nvSpPr>
+              <p:cNvPr id="28677" name="AutoShape 9"/>
+              <p:cNvSpPr>
+                <a:spLocks noChangeArrowheads="1"/>
+              </p:cNvSpPr>
+              <p:nvPr/>
+            </p:nvSpPr>
+            <p:spPr bwMode="auto">
+              <a:xfrm rot="-3596887">
+                <a:off x="3671888" y="149225"/>
+                <a:ext cx="1733550" cy="2984500"/>
+              </a:xfrm>
+              <a:prstGeom prst="rtTriangle">
+                <a:avLst/>
+              </a:prstGeom>
+              <a:solidFill>
+                <a:schemeClr val="folHlink"/>
+              </a:solidFill>
+              <a:ln w="9525">
+                <a:solidFill>
+                  <a:schemeClr val="tx1"/>
+                </a:solidFill>
+                <a:miter lim="800000"/>
+                <a:headEnd/>
+                <a:tailEnd/>
+              </a:ln>
+            </p:spPr>
+            <p:txBody>
+              <a:bodyPr vert="eaVert" wrap="none" anchor="ctr"/>
+              <a:lstStyle/>
+              <a:p>
+                <a:endParaRPr lang="en-US" sz="2400">
+                  <a:latin typeface="Comic Sans MS" pitchFamily="66" charset="0"/>
+                </a:endParaRPr>
+              </a:p>
+            </p:txBody>
+          </p:sp>
+          <p:grpSp>
+            <p:nvGrpSpPr>
+              <p:cNvPr id="3" name="Group 2"/>
+              <p:cNvGrpSpPr/>
+              <p:nvPr/>
+            </p:nvGrpSpPr>
+            <p:grpSpPr>
+              <a:xfrm>
+                <a:off x="1993900" y="1566863"/>
+                <a:ext cx="5157788" cy="3552825"/>
+                <a:chOff x="1993900" y="1554163"/>
+                <a:chExt cx="5157788" cy="3552825"/>
+              </a:xfrm>
+            </p:grpSpPr>
+            <p:sp>
+              <p:nvSpPr>
+                <p:cNvPr id="28678" name="AutoShape 10"/>
+                <p:cNvSpPr>
+                  <a:spLocks noChangeArrowheads="1"/>
+                </p:cNvSpPr>
+                <p:nvPr/>
+              </p:nvSpPr>
+              <p:spPr bwMode="auto">
+                <a:xfrm rot="-9022836">
+                  <a:off x="1993900" y="1911350"/>
+                  <a:ext cx="1720850" cy="3005138"/>
+                </a:xfrm>
+                <a:prstGeom prst="rtTriangle">
+                  <a:avLst/>
+                </a:prstGeom>
+                <a:solidFill>
+                  <a:srgbClr val="DDDDDD"/>
+                </a:solidFill>
+                <a:ln w="9525">
+                  <a:solidFill>
+                    <a:schemeClr val="tx1"/>
+                  </a:solidFill>
+                  <a:miter lim="800000"/>
+                  <a:headEnd/>
+                  <a:tailEnd/>
+                </a:ln>
+              </p:spPr>
+              <p:txBody>
+                <a:bodyPr wrap="none" anchor="ctr"/>
+                <a:lstStyle/>
+                <a:p>
+                  <a:endParaRPr lang="en-US" sz="2400">
+                    <a:latin typeface="Comic Sans MS" pitchFamily="66" charset="0"/>
+                  </a:endParaRPr>
+                </a:p>
+              </p:txBody>
+            </p:sp>
+            <p:grpSp>
+              <p:nvGrpSpPr>
+                <p:cNvPr id="2" name="Group 1"/>
+                <p:cNvGrpSpPr/>
+                <p:nvPr/>
+              </p:nvGrpSpPr>
+              <p:grpSpPr>
+                <a:xfrm>
+                  <a:off x="2789238" y="1554163"/>
+                  <a:ext cx="4362450" cy="3552825"/>
+                  <a:chOff x="2801938" y="1554163"/>
+                  <a:chExt cx="4362450" cy="3552825"/>
+                </a:xfrm>
+              </p:grpSpPr>
+              <p:sp>
+                <p:nvSpPr>
+                  <p:cNvPr id="28676" name="AutoShape 7"/>
+                  <p:cNvSpPr>
+                    <a:spLocks noChangeArrowheads="1"/>
+                  </p:cNvSpPr>
+                  <p:nvPr/>
+                </p:nvSpPr>
+                <p:spPr bwMode="auto">
+                  <a:xfrm rot="1768937">
+                    <a:off x="5443538" y="1833563"/>
+                    <a:ext cx="1720850" cy="3005137"/>
+                  </a:xfrm>
+                  <a:prstGeom prst="rtTriangle">
+                    <a:avLst/>
+                  </a:prstGeom>
+                  <a:solidFill>
+                    <a:schemeClr val="bg2"/>
+                  </a:solidFill>
+                  <a:ln w="9525">
+                    <a:solidFill>
+                      <a:schemeClr val="tx1"/>
+                    </a:solidFill>
+                    <a:miter lim="800000"/>
+                    <a:headEnd/>
+                    <a:tailEnd/>
+                  </a:ln>
+                </p:spPr>
+                <p:txBody>
+                  <a:bodyPr wrap="none" anchor="ctr"/>
+                  <a:lstStyle/>
+                  <a:p>
+                    <a:endParaRPr lang="en-US" sz="2400">
+                      <a:latin typeface="Comic Sans MS" pitchFamily="66" charset="0"/>
+                    </a:endParaRPr>
+                  </a:p>
+                </p:txBody>
+              </p:sp>
+              <p:sp>
+                <p:nvSpPr>
+                  <p:cNvPr id="28680" name="Text Box 11"/>
+                  <p:cNvSpPr txBox="1">
+                    <a:spLocks noChangeArrowheads="1"/>
+                  </p:cNvSpPr>
+                  <p:nvPr/>
+                </p:nvSpPr>
+                <p:spPr bwMode="auto">
+                  <a:xfrm>
+                    <a:off x="4149725" y="4645025"/>
+                    <a:ext cx="342900" cy="461963"/>
+                  </a:xfrm>
+                  <a:prstGeom prst="rect">
+                    <a:avLst/>
+                  </a:prstGeom>
+                  <a:noFill/>
+                  <a:ln w="9525">
+                    <a:noFill/>
+                    <a:miter lim="800000"/>
+                    <a:headEnd/>
+                    <a:tailEnd/>
+                  </a:ln>
+                </p:spPr>
+                <p:txBody>
+                  <a:bodyPr wrap="none">
+                    <a:spAutoFit/>
+                  </a:bodyPr>
+                  <a:lstStyle/>
+                  <a:p>
+                    <a:r>
+                      <a:rPr lang="en-US" sz="2400" b="1">
+                        <a:latin typeface="Comic Sans MS" pitchFamily="66" charset="0"/>
+                      </a:rPr>
+                      <a:t>c</a:t>
+                    </a:r>
+                  </a:p>
+                </p:txBody>
+              </p:sp>
+              <p:sp>
+                <p:nvSpPr>
+                  <p:cNvPr id="28681" name="Text Box 12"/>
+                  <p:cNvSpPr txBox="1">
+                    <a:spLocks noChangeArrowheads="1"/>
+                  </p:cNvSpPr>
+                  <p:nvPr/>
+                </p:nvSpPr>
+                <p:spPr bwMode="auto">
+                  <a:xfrm>
+                    <a:off x="5902325" y="3086100"/>
+                    <a:ext cx="342900" cy="461963"/>
+                  </a:xfrm>
+                  <a:prstGeom prst="rect">
+                    <a:avLst/>
+                  </a:prstGeom>
+                  <a:noFill/>
+                  <a:ln w="9525">
+                    <a:noFill/>
+                    <a:miter lim="800000"/>
+                    <a:headEnd/>
+                    <a:tailEnd/>
+                  </a:ln>
+                </p:spPr>
+                <p:txBody>
+                  <a:bodyPr wrap="none">
+                    <a:spAutoFit/>
+                  </a:bodyPr>
+                  <a:lstStyle/>
+                  <a:p>
+                    <a:r>
+                      <a:rPr lang="en-US" sz="2400" b="1">
+                        <a:latin typeface="Comic Sans MS" pitchFamily="66" charset="0"/>
+                      </a:rPr>
+                      <a:t>c</a:t>
+                    </a:r>
+                  </a:p>
+                </p:txBody>
+              </p:sp>
+              <p:sp>
+                <p:nvSpPr>
+                  <p:cNvPr id="28682" name="Text Box 13"/>
+                  <p:cNvSpPr txBox="1">
+                    <a:spLocks noChangeArrowheads="1"/>
+                  </p:cNvSpPr>
+                  <p:nvPr/>
+                </p:nvSpPr>
+                <p:spPr bwMode="auto">
+                  <a:xfrm>
+                    <a:off x="2801938" y="2970213"/>
+                    <a:ext cx="342900" cy="461962"/>
+                  </a:xfrm>
+                  <a:prstGeom prst="rect">
+                    <a:avLst/>
+                  </a:prstGeom>
+                  <a:noFill/>
+                  <a:ln w="9525">
+                    <a:noFill/>
+                    <a:miter lim="800000"/>
+                    <a:headEnd/>
+                    <a:tailEnd/>
+                  </a:ln>
+                </p:spPr>
+                <p:txBody>
+                  <a:bodyPr wrap="none">
+                    <a:spAutoFit/>
+                  </a:bodyPr>
+                  <a:lstStyle/>
+                  <a:p>
+                    <a:r>
+                      <a:rPr lang="en-US" sz="2400" b="1">
+                        <a:latin typeface="Comic Sans MS" pitchFamily="66" charset="0"/>
+                      </a:rPr>
+                      <a:t>c</a:t>
+                    </a:r>
+                  </a:p>
+                </p:txBody>
+              </p:sp>
+              <p:sp>
+                <p:nvSpPr>
+                  <p:cNvPr id="28683" name="Text Box 14"/>
+                  <p:cNvSpPr txBox="1">
+                    <a:spLocks noChangeArrowheads="1"/>
+                  </p:cNvSpPr>
+                  <p:nvPr/>
+                </p:nvSpPr>
+                <p:spPr bwMode="auto">
+                  <a:xfrm>
+                    <a:off x="3338513" y="4124325"/>
+                    <a:ext cx="355600" cy="461963"/>
+                  </a:xfrm>
+                  <a:prstGeom prst="rect">
+                    <a:avLst/>
+                  </a:prstGeom>
+                  <a:noFill/>
+                  <a:ln w="9525">
+                    <a:noFill/>
+                    <a:miter lim="800000"/>
+                    <a:headEnd/>
+                    <a:tailEnd/>
+                  </a:ln>
+                </p:spPr>
+                <p:txBody>
+                  <a:bodyPr wrap="none">
+                    <a:spAutoFit/>
+                  </a:bodyPr>
+                  <a:lstStyle/>
+                  <a:p>
+                    <a:r>
+                      <a:rPr lang="en-US" sz="2400" b="1">
+                        <a:latin typeface="Comic Sans MS" pitchFamily="66" charset="0"/>
+                      </a:rPr>
+                      <a:t>a</a:t>
+                    </a:r>
+                  </a:p>
+                </p:txBody>
+              </p:sp>
+              <p:sp>
+                <p:nvSpPr>
+                  <p:cNvPr id="28684" name="Text Box 15"/>
+                  <p:cNvSpPr txBox="1">
+                    <a:spLocks noChangeArrowheads="1"/>
+                  </p:cNvSpPr>
+                  <p:nvPr/>
+                </p:nvSpPr>
+                <p:spPr bwMode="auto">
+                  <a:xfrm>
+                    <a:off x="4495800" y="4211638"/>
+                    <a:ext cx="584200" cy="461962"/>
+                  </a:xfrm>
+                  <a:prstGeom prst="rect">
+                    <a:avLst/>
+                  </a:prstGeom>
+                  <a:noFill/>
+                  <a:ln w="9525">
+                    <a:noFill/>
+                    <a:miter lim="800000"/>
+                    <a:headEnd/>
+                    <a:tailEnd/>
+                  </a:ln>
+                </p:spPr>
+                <p:txBody>
+                  <a:bodyPr>
+                    <a:spAutoFit/>
+                  </a:bodyPr>
+                  <a:lstStyle/>
+                  <a:p>
+                    <a:r>
+                      <a:rPr lang="en-US" sz="2400" b="1">
+                        <a:latin typeface="Comic Sans MS" pitchFamily="66" charset="0"/>
+                      </a:rPr>
+                      <a:t>b</a:t>
+                    </a:r>
+                  </a:p>
+                </p:txBody>
+              </p:sp>
+              <p:sp>
+                <p:nvSpPr>
+                  <p:cNvPr id="28685" name="Text Box 16"/>
+                  <p:cNvSpPr txBox="1">
+                    <a:spLocks noChangeArrowheads="1"/>
+                  </p:cNvSpPr>
+                  <p:nvPr/>
+                </p:nvSpPr>
+                <p:spPr bwMode="auto">
+                  <a:xfrm>
+                    <a:off x="4356100" y="1554163"/>
+                    <a:ext cx="344488" cy="461962"/>
+                  </a:xfrm>
+                  <a:prstGeom prst="rect">
+                    <a:avLst/>
+                  </a:prstGeom>
+                  <a:noFill/>
+                  <a:ln w="9525">
+                    <a:noFill/>
+                    <a:miter lim="800000"/>
+                    <a:headEnd/>
+                    <a:tailEnd/>
+                  </a:ln>
+                </p:spPr>
+                <p:txBody>
+                  <a:bodyPr wrap="none">
+                    <a:spAutoFit/>
+                  </a:bodyPr>
+                  <a:lstStyle/>
+                  <a:p>
+                    <a:r>
+                      <a:rPr lang="en-US" sz="2400" b="1">
+                        <a:latin typeface="Comic Sans MS" pitchFamily="66" charset="0"/>
+                      </a:rPr>
+                      <a:t>c</a:t>
+                    </a:r>
+                  </a:p>
+                </p:txBody>
+              </p:sp>
+              <p:sp>
+                <p:nvSpPr>
+                  <p:cNvPr id="28686" name="Rectangle 17"/>
+                  <p:cNvSpPr>
+                    <a:spLocks noChangeArrowheads="1"/>
+                  </p:cNvSpPr>
+                  <p:nvPr/>
+                </p:nvSpPr>
+                <p:spPr bwMode="auto">
+                  <a:xfrm rot="1800000">
+                    <a:off x="3981450" y="2759075"/>
+                    <a:ext cx="1198563" cy="1206500"/>
+                  </a:xfrm>
+                  <a:prstGeom prst="rect">
+                    <a:avLst/>
+                  </a:prstGeom>
+                  <a:solidFill>
+                    <a:srgbClr val="FFFF00"/>
+                  </a:solidFill>
+                  <a:ln w="9525">
+                    <a:solidFill>
+                      <a:schemeClr val="tx1"/>
+                    </a:solidFill>
+                    <a:miter lim="800000"/>
+                    <a:headEnd/>
+                    <a:tailEnd type="none" w="lg" len="lg"/>
+                  </a:ln>
+                </p:spPr>
+                <p:txBody>
+                  <a:bodyPr wrap="none" anchor="ctr"/>
+                  <a:lstStyle/>
+                  <a:p>
+                    <a:endParaRPr lang="en-US" sz="2400">
+                      <a:latin typeface="Comic Sans MS" pitchFamily="66" charset="0"/>
+                    </a:endParaRPr>
+                  </a:p>
+                </p:txBody>
+              </p:sp>
+              <p:sp>
+                <p:nvSpPr>
+                  <p:cNvPr id="28687" name="Text Box 21"/>
+                  <p:cNvSpPr txBox="1">
+                    <a:spLocks noChangeArrowheads="1"/>
+                  </p:cNvSpPr>
+                  <p:nvPr/>
+                </p:nvSpPr>
+                <p:spPr bwMode="auto">
+                  <a:xfrm rot="-3562255">
+                    <a:off x="3471069" y="2677319"/>
+                    <a:ext cx="727075" cy="461963"/>
+                  </a:xfrm>
+                  <a:prstGeom prst="rect">
+                    <a:avLst/>
+                  </a:prstGeom>
+                  <a:noFill/>
+                  <a:ln w="9525" algn="ctr">
+                    <a:noFill/>
+                    <a:miter lim="800000"/>
+                    <a:headEnd/>
+                    <a:tailEnd/>
+                  </a:ln>
+                </p:spPr>
+                <p:txBody>
+                  <a:bodyPr wrap="none">
+                    <a:spAutoFit/>
+                  </a:bodyPr>
+                  <a:lstStyle/>
+                  <a:p>
+                    <a:r>
+                      <a:rPr lang="en-US" sz="2400" b="1">
+                        <a:latin typeface="Comic Sans MS" pitchFamily="66" charset="0"/>
+                      </a:rPr>
+                      <a:t>b</a:t>
+                    </a:r>
+                    <a:r>
+                      <a:rPr lang="en-US" sz="2400" b="1">
+                        <a:latin typeface="Comic Sans MS" pitchFamily="66" charset="0"/>
+                        <a:cs typeface="Times New Roman" pitchFamily="18" charset="0"/>
+                      </a:rPr>
+                      <a:t>-</a:t>
+                    </a:r>
+                    <a:r>
+                      <a:rPr lang="en-US" sz="2400" b="1">
+                        <a:latin typeface="Comic Sans MS" pitchFamily="66" charset="0"/>
+                      </a:rPr>
+                      <a:t>a</a:t>
+                    </a:r>
+                  </a:p>
+                </p:txBody>
+              </p:sp>
+            </p:grpSp>
+          </p:grpSp>
+        </p:grpSp>
+        <p:sp>
+          <p:nvSpPr>
+            <p:cNvPr id="28679" name="AutoShape 8"/>
+            <p:cNvSpPr>
+              <a:spLocks noChangeArrowheads="1"/>
+            </p:cNvSpPr>
+            <p:nvPr/>
+          </p:nvSpPr>
+          <p:spPr bwMode="auto">
+            <a:xfrm rot="7183246">
+              <a:off x="3752850" y="3616325"/>
+              <a:ext cx="1733550" cy="2984500"/>
+            </a:xfrm>
+            <a:prstGeom prst="rtTriangle">
+              <a:avLst/>
+            </a:prstGeom>
             <a:solidFill>
-              <a:schemeClr val="tx1"/>
+              <a:schemeClr val="accent2"/>
             </a:solidFill>
-            <a:miter lim="800000"/>
-            <a:headEnd/>
-            <a:tailEnd/>
-          </a:ln>
-        </p:spPr>
-        <p:txBody>
-          <a:bodyPr wrap="none" anchor="ctr"/>
-          <a:lstStyle/>
-          <a:p>
-            <a:endParaRPr lang="en-US" sz="2400">
-              <a:latin typeface="Comic Sans MS" pitchFamily="66" charset="0"/>
-            </a:endParaRPr>
-          </a:p>
-        </p:txBody>
-      </p:sp>
-      <p:sp>
-        <p:nvSpPr>
-          <p:cNvPr id="28677" name="AutoShape 9"/>
-          <p:cNvSpPr>
-            <a:spLocks noChangeArrowheads="1"/>
-          </p:cNvSpPr>
-          <p:nvPr/>
-        </p:nvSpPr>
-        <p:spPr bwMode="auto">
-          <a:xfrm rot="-3596887">
-            <a:off x="3671888" y="149225"/>
-            <a:ext cx="1733550" cy="2984500"/>
-          </a:xfrm>
-          <a:prstGeom prst="rtTriangle">
-            <a:avLst/>
-          </a:prstGeom>
-          <a:solidFill>
-            <a:schemeClr val="folHlink"/>
-          </a:solidFill>
-          <a:ln w="9525">
-            <a:solidFill>
-              <a:schemeClr val="tx1"/>
-            </a:solidFill>
-            <a:miter lim="800000"/>
-            <a:headEnd/>
-            <a:tailEnd/>
-          </a:ln>
-        </p:spPr>
-        <p:txBody>
-          <a:bodyPr vert="eaVert" wrap="none" anchor="ctr"/>
-          <a:lstStyle/>
-          <a:p>
-            <a:endParaRPr lang="en-US" sz="2400">
-              <a:latin typeface="Comic Sans MS" pitchFamily="66" charset="0"/>
-            </a:endParaRPr>
-          </a:p>
-        </p:txBody>
-      </p:sp>
-      <p:sp>
-        <p:nvSpPr>
-          <p:cNvPr id="28678" name="AutoShape 10"/>
-          <p:cNvSpPr>
-            <a:spLocks noChangeArrowheads="1"/>
-          </p:cNvSpPr>
-          <p:nvPr/>
-        </p:nvSpPr>
-        <p:spPr bwMode="auto">
-          <a:xfrm rot="-9022836">
-            <a:off x="1993900" y="1911350"/>
-            <a:ext cx="1720850" cy="3005138"/>
-          </a:xfrm>
-          <a:prstGeom prst="rtTriangle">
-            <a:avLst/>
-          </a:prstGeom>
-          <a:solidFill>
-            <a:srgbClr val="DDDDDD"/>
-          </a:solidFill>
-          <a:ln w="9525">
-            <a:solidFill>
-              <a:schemeClr val="tx1"/>
-            </a:solidFill>
-            <a:miter lim="800000"/>
-            <a:headEnd/>
-            <a:tailEnd/>
-          </a:ln>
-        </p:spPr>
-        <p:txBody>
-          <a:bodyPr wrap="none" anchor="ctr"/>
-          <a:lstStyle/>
-          <a:p>
-            <a:endParaRPr lang="en-US" sz="2400">
-              <a:latin typeface="Comic Sans MS" pitchFamily="66" charset="0"/>
-            </a:endParaRPr>
-          </a:p>
-        </p:txBody>
-      </p:sp>
-      <p:sp>
-        <p:nvSpPr>
-          <p:cNvPr id="28679" name="AutoShape 8"/>
-          <p:cNvSpPr>
-            <a:spLocks noChangeArrowheads="1"/>
-          </p:cNvSpPr>
-          <p:nvPr/>
-        </p:nvSpPr>
-        <p:spPr bwMode="auto">
-          <a:xfrm rot="7183246">
-            <a:off x="3752850" y="3616325"/>
-            <a:ext cx="1733550" cy="2984500"/>
-          </a:xfrm>
-          <a:prstGeom prst="rtTriangle">
-            <a:avLst/>
-          </a:prstGeom>
-          <a:solidFill>
-            <a:schemeClr val="accent2"/>
-          </a:solidFill>
-          <a:ln w="9525">
-            <a:solidFill>
-              <a:schemeClr val="tx1"/>
-            </a:solidFill>
-            <a:miter lim="800000"/>
-            <a:headEnd/>
-            <a:tailEnd/>
-          </a:ln>
-        </p:spPr>
-        <p:txBody>
-          <a:bodyPr rot="10800000" vert="eaVert" wrap="none" anchor="ctr"/>
-          <a:lstStyle/>
-          <a:p>
-            <a:endParaRPr lang="en-US" sz="2400">
-              <a:latin typeface="Comic Sans MS" pitchFamily="66" charset="0"/>
-            </a:endParaRPr>
-          </a:p>
-        </p:txBody>
-      </p:sp>
-      <p:sp>
-        <p:nvSpPr>
-          <p:cNvPr id="28680" name="Text Box 11"/>
-          <p:cNvSpPr txBox="1">
-            <a:spLocks noChangeArrowheads="1"/>
-          </p:cNvSpPr>
-          <p:nvPr/>
-        </p:nvSpPr>
-        <p:spPr bwMode="auto">
-          <a:xfrm>
-            <a:off x="4149725" y="4645025"/>
-            <a:ext cx="342900" cy="461963"/>
-          </a:xfrm>
-          <a:prstGeom prst="rect">
-            <a:avLst/>
-          </a:prstGeom>
-          <a:noFill/>
-          <a:ln w="9525">
-            <a:noFill/>
-            <a:miter lim="800000"/>
-            <a:headEnd/>
-            <a:tailEnd/>
-          </a:ln>
-        </p:spPr>
-        <p:txBody>
-          <a:bodyPr wrap="none">
-            <a:spAutoFit/>
-          </a:bodyPr>
-          <a:lstStyle/>
-          <a:p>
-            <a:r>
-              <a:rPr lang="en-US" sz="2400" b="1">
+            <a:ln w="9525">
+              <a:solidFill>
+                <a:schemeClr val="tx1"/>
+              </a:solidFill>
+              <a:miter lim="800000"/>
+              <a:headEnd/>
+              <a:tailEnd/>
+            </a:ln>
+          </p:spPr>
+          <p:txBody>
+            <a:bodyPr rot="10800000" vert="eaVert" wrap="none" anchor="ctr"/>
+            <a:lstStyle/>
+            <a:p>
+              <a:endParaRPr lang="en-US" sz="2400">
                 <a:latin typeface="Comic Sans MS" pitchFamily="66" charset="0"/>
-              </a:rPr>
-              <a:t>c</a:t>
-            </a:r>
-          </a:p>
-        </p:txBody>
-      </p:sp>
-      <p:sp>
-        <p:nvSpPr>
-          <p:cNvPr id="28681" name="Text Box 12"/>
-          <p:cNvSpPr txBox="1">
-            <a:spLocks noChangeArrowheads="1"/>
-          </p:cNvSpPr>
-          <p:nvPr/>
-        </p:nvSpPr>
-        <p:spPr bwMode="auto">
-          <a:xfrm>
-            <a:off x="5902325" y="3086100"/>
-            <a:ext cx="342900" cy="461963"/>
-          </a:xfrm>
-          <a:prstGeom prst="rect">
-            <a:avLst/>
-          </a:prstGeom>
-          <a:noFill/>
-          <a:ln w="9525">
-            <a:noFill/>
-            <a:miter lim="800000"/>
-            <a:headEnd/>
-            <a:tailEnd/>
-          </a:ln>
-        </p:spPr>
-        <p:txBody>
-          <a:bodyPr wrap="none">
-            <a:spAutoFit/>
-          </a:bodyPr>
-          <a:lstStyle/>
-          <a:p>
-            <a:r>
-              <a:rPr lang="en-US" sz="2400" b="1">
-                <a:latin typeface="Comic Sans MS" pitchFamily="66" charset="0"/>
-              </a:rPr>
-              <a:t>c</a:t>
-            </a:r>
-          </a:p>
-        </p:txBody>
-      </p:sp>
-      <p:sp>
-        <p:nvSpPr>
-          <p:cNvPr id="28682" name="Text Box 13"/>
-          <p:cNvSpPr txBox="1">
-            <a:spLocks noChangeArrowheads="1"/>
-          </p:cNvSpPr>
-          <p:nvPr/>
-        </p:nvSpPr>
-        <p:spPr bwMode="auto">
-          <a:xfrm>
-            <a:off x="2801938" y="2970213"/>
-            <a:ext cx="342900" cy="461962"/>
-          </a:xfrm>
-          <a:prstGeom prst="rect">
-            <a:avLst/>
-          </a:prstGeom>
-          <a:noFill/>
-          <a:ln w="9525">
-            <a:noFill/>
-            <a:miter lim="800000"/>
-            <a:headEnd/>
-            <a:tailEnd/>
-          </a:ln>
-        </p:spPr>
-        <p:txBody>
-          <a:bodyPr wrap="none">
-            <a:spAutoFit/>
-          </a:bodyPr>
-          <a:lstStyle/>
-          <a:p>
-            <a:r>
-              <a:rPr lang="en-US" sz="2400" b="1">
-                <a:latin typeface="Comic Sans MS" pitchFamily="66" charset="0"/>
-              </a:rPr>
-              <a:t>c</a:t>
-            </a:r>
-          </a:p>
-        </p:txBody>
-      </p:sp>
-      <p:sp>
-        <p:nvSpPr>
-          <p:cNvPr id="28683" name="Text Box 14"/>
-          <p:cNvSpPr txBox="1">
-            <a:spLocks noChangeArrowheads="1"/>
-          </p:cNvSpPr>
-          <p:nvPr/>
-        </p:nvSpPr>
-        <p:spPr bwMode="auto">
-          <a:xfrm>
-            <a:off x="3338513" y="4124325"/>
-            <a:ext cx="355600" cy="461963"/>
-          </a:xfrm>
-          <a:prstGeom prst="rect">
-            <a:avLst/>
-          </a:prstGeom>
-          <a:noFill/>
-          <a:ln w="9525">
-            <a:noFill/>
-            <a:miter lim="800000"/>
-            <a:headEnd/>
-            <a:tailEnd/>
-          </a:ln>
-        </p:spPr>
-        <p:txBody>
-          <a:bodyPr wrap="none">
-            <a:spAutoFit/>
-          </a:bodyPr>
-          <a:lstStyle/>
-          <a:p>
-            <a:r>
-              <a:rPr lang="en-US" sz="2400" b="1">
-                <a:latin typeface="Comic Sans MS" pitchFamily="66" charset="0"/>
-              </a:rPr>
-              <a:t>a</a:t>
-            </a:r>
-          </a:p>
-        </p:txBody>
-      </p:sp>
-      <p:sp>
-        <p:nvSpPr>
-          <p:cNvPr id="28684" name="Text Box 15"/>
-          <p:cNvSpPr txBox="1">
-            <a:spLocks noChangeArrowheads="1"/>
-          </p:cNvSpPr>
-          <p:nvPr/>
-        </p:nvSpPr>
-        <p:spPr bwMode="auto">
-          <a:xfrm>
-            <a:off x="4495800" y="4211638"/>
-            <a:ext cx="584200" cy="461962"/>
-          </a:xfrm>
-          <a:prstGeom prst="rect">
-            <a:avLst/>
-          </a:prstGeom>
-          <a:noFill/>
-          <a:ln w="9525">
-            <a:noFill/>
-            <a:miter lim="800000"/>
-            <a:headEnd/>
-            <a:tailEnd/>
-          </a:ln>
-        </p:spPr>
-        <p:txBody>
-          <a:bodyPr>
-            <a:spAutoFit/>
-          </a:bodyPr>
-          <a:lstStyle/>
-          <a:p>
-            <a:r>
-              <a:rPr lang="en-US" sz="2400" b="1">
-                <a:latin typeface="Comic Sans MS" pitchFamily="66" charset="0"/>
-              </a:rPr>
-              <a:t>b</a:t>
-            </a:r>
-          </a:p>
-        </p:txBody>
-      </p:sp>
-      <p:sp>
-        <p:nvSpPr>
-          <p:cNvPr id="28685" name="Text Box 16"/>
-          <p:cNvSpPr txBox="1">
-            <a:spLocks noChangeArrowheads="1"/>
-          </p:cNvSpPr>
-          <p:nvPr/>
-        </p:nvSpPr>
-        <p:spPr bwMode="auto">
-          <a:xfrm>
-            <a:off x="4356100" y="1554163"/>
-            <a:ext cx="344488" cy="461962"/>
-          </a:xfrm>
-          <a:prstGeom prst="rect">
-            <a:avLst/>
-          </a:prstGeom>
-          <a:noFill/>
-          <a:ln w="9525">
-            <a:noFill/>
-            <a:miter lim="800000"/>
-            <a:headEnd/>
-            <a:tailEnd/>
-          </a:ln>
-        </p:spPr>
-        <p:txBody>
-          <a:bodyPr wrap="none">
-            <a:spAutoFit/>
-          </a:bodyPr>
-          <a:lstStyle/>
-          <a:p>
-            <a:r>
-              <a:rPr lang="en-US" sz="2400" b="1">
-                <a:latin typeface="Comic Sans MS" pitchFamily="66" charset="0"/>
-              </a:rPr>
-              <a:t>c</a:t>
-            </a:r>
-          </a:p>
-        </p:txBody>
-      </p:sp>
-      <p:sp>
-        <p:nvSpPr>
-          <p:cNvPr id="28686" name="Rectangle 17"/>
-          <p:cNvSpPr>
-            <a:spLocks noChangeArrowheads="1"/>
-          </p:cNvSpPr>
-          <p:nvPr/>
-        </p:nvSpPr>
-        <p:spPr bwMode="auto">
-          <a:xfrm rot="1800000">
-            <a:off x="3981450" y="2759075"/>
-            <a:ext cx="1198563" cy="1206500"/>
-          </a:xfrm>
-          <a:prstGeom prst="rect">
-            <a:avLst/>
-          </a:prstGeom>
-          <a:solidFill>
-            <a:srgbClr val="FFFF00"/>
-          </a:solidFill>
-          <a:ln w="9525">
-            <a:solidFill>
-              <a:schemeClr val="tx1"/>
-            </a:solidFill>
-            <a:miter lim="800000"/>
-            <a:headEnd/>
-            <a:tailEnd type="none" w="lg" len="lg"/>
-          </a:ln>
-        </p:spPr>
-        <p:txBody>
-          <a:bodyPr wrap="none" anchor="ctr"/>
-          <a:lstStyle/>
-          <a:p>
-            <a:endParaRPr lang="en-US" sz="2400">
-              <a:latin typeface="Comic Sans MS" pitchFamily="66" charset="0"/>
-            </a:endParaRPr>
-          </a:p>
-        </p:txBody>
-      </p:sp>
-      <p:sp>
-        <p:nvSpPr>
-          <p:cNvPr id="28687" name="Text Box 21"/>
-          <p:cNvSpPr txBox="1">
-            <a:spLocks noChangeArrowheads="1"/>
-          </p:cNvSpPr>
-          <p:nvPr/>
-        </p:nvSpPr>
-        <p:spPr bwMode="auto">
-          <a:xfrm rot="-3562255">
-            <a:off x="3471069" y="2677319"/>
-            <a:ext cx="727075" cy="461963"/>
-          </a:xfrm>
-          <a:prstGeom prst="rect">
-            <a:avLst/>
-          </a:prstGeom>
-          <a:noFill/>
-          <a:ln w="9525" algn="ctr">
-            <a:noFill/>
-            <a:miter lim="800000"/>
-            <a:headEnd/>
-            <a:tailEnd/>
-          </a:ln>
-        </p:spPr>
-        <p:txBody>
-          <a:bodyPr wrap="none">
-            <a:spAutoFit/>
-          </a:bodyPr>
-          <a:lstStyle/>
-          <a:p>
-            <a:r>
-              <a:rPr lang="en-US" sz="2400" b="1">
-                <a:latin typeface="Comic Sans MS" pitchFamily="66" charset="0"/>
-              </a:rPr>
-              <a:t>b</a:t>
-            </a:r>
-            <a:r>
-              <a:rPr lang="en-US" sz="2400" b="1">
-                <a:latin typeface="Comic Sans MS" pitchFamily="66" charset="0"/>
-                <a:cs typeface="Times New Roman" pitchFamily="18" charset="0"/>
-              </a:rPr>
-              <a:t>-</a:t>
-            </a:r>
-            <a:r>
-              <a:rPr lang="en-US" sz="2400" b="1">
-                <a:latin typeface="Comic Sans MS" pitchFamily="66" charset="0"/>
-              </a:rPr>
-              <a:t>a</a:t>
-            </a:r>
-          </a:p>
-        </p:txBody>
-      </p:sp>
+              </a:endParaRPr>
+            </a:p>
+          </p:txBody>
+        </p:sp>
+      </p:grpSp>
     </p:spTree>
   </p:cSld>
   <p:clrMapOvr>
@@ -12292,7 +12373,7 @@
           <a:graphicData uri="http://schemas.openxmlformats.org/presentationml/2006/ole">
             <mc:AlternateContent xmlns:mc="http://schemas.openxmlformats.org/markup-compatibility/2006">
               <mc:Choice xmlns:v="urn:schemas-microsoft-com:vml" Requires="v">
-                <p:oleObj spid="_x0000_s194650" name="Equation" r:id="rId4" imgW="914400" imgH="215640" progId="Equation.3">
+                <p:oleObj spid="_x0000_s194657" name="Equation" r:id="rId4" imgW="914400" imgH="215640" progId="Equation.3">
                   <p:embed/>
                 </p:oleObj>
               </mc:Choice>
@@ -12362,7 +12443,7 @@
           <a:graphicData uri="http://schemas.openxmlformats.org/presentationml/2006/ole">
             <mc:AlternateContent xmlns:mc="http://schemas.openxmlformats.org/markup-compatibility/2006">
               <mc:Choice xmlns:v="urn:schemas-microsoft-com:vml" Requires="v">
-                <p:oleObj spid="_x0000_s194651" name="Equation" r:id="rId6" imgW="914400" imgH="215640" progId="Equation.3">
+                <p:oleObj spid="_x0000_s194658" name="Equation" r:id="rId6" imgW="914400" imgH="215640" progId="Equation.3">
                   <p:embed/>
                 </p:oleObj>
               </mc:Choice>
@@ -12888,7 +12969,7 @@
           <a:graphicData uri="http://schemas.openxmlformats.org/presentationml/2006/ole">
             <mc:AlternateContent xmlns:mc="http://schemas.openxmlformats.org/markup-compatibility/2006">
               <mc:Choice xmlns:v="urn:schemas-microsoft-com:vml" Requires="v">
-                <p:oleObj spid="_x0000_s7300" name="Equation" r:id="rId4" imgW="304560" imgH="139680" progId="Equation.DSMT4">
+                <p:oleObj spid="_x0000_s7307" name="Equation" r:id="rId4" imgW="304560" imgH="139680" progId="Equation.DSMT4">
                   <p:embed/>
                 </p:oleObj>
               </mc:Choice>
@@ -12958,7 +13039,7 @@
           <a:graphicData uri="http://schemas.openxmlformats.org/presentationml/2006/ole">
             <mc:AlternateContent xmlns:mc="http://schemas.openxmlformats.org/markup-compatibility/2006">
               <mc:Choice xmlns:v="urn:schemas-microsoft-com:vml" Requires="v">
-                <p:oleObj spid="_x0000_s7301" name="Equation" r:id="rId6" imgW="304560" imgH="139680" progId="Equation.DSMT4">
+                <p:oleObj spid="_x0000_s7308" name="Equation" r:id="rId6" imgW="304560" imgH="139680" progId="Equation.DSMT4">
                   <p:embed/>
                 </p:oleObj>
               </mc:Choice>
@@ -13359,7 +13440,7 @@
           <a:graphicData uri="http://schemas.openxmlformats.org/presentationml/2006/ole">
             <mc:AlternateContent xmlns:mc="http://schemas.openxmlformats.org/markup-compatibility/2006">
               <mc:Choice xmlns:v="urn:schemas-microsoft-com:vml" Requires="v">
-                <p:oleObj spid="_x0000_s209997" name="Equation" r:id="rId4" imgW="114120" imgH="177480" progId="Equation.DSMT4">
+                <p:oleObj spid="_x0000_s210004" name="Equation" r:id="rId4" imgW="114120" imgH="177480" progId="Equation.DSMT4">
                   <p:embed/>
                 </p:oleObj>
               </mc:Choice>
@@ -13964,7 +14045,7 @@
           <a:graphicData uri="http://schemas.openxmlformats.org/presentationml/2006/ole">
             <mc:AlternateContent xmlns:mc="http://schemas.openxmlformats.org/markup-compatibility/2006">
               <mc:Choice xmlns:v="urn:schemas-microsoft-com:vml" Requires="v">
-                <p:oleObj spid="_x0000_s209998" name="Equation" r:id="rId6" imgW="635000" imgH="469900" progId="Equation.DSMT4">
+                <p:oleObj spid="_x0000_s210005" name="Equation" r:id="rId6" imgW="635000" imgH="469900" progId="Equation.DSMT4">
                   <p:embed/>
                 </p:oleObj>
               </mc:Choice>
@@ -14192,7 +14273,7 @@
           <a:graphicData uri="http://schemas.openxmlformats.org/presentationml/2006/ole">
             <mc:AlternateContent xmlns:mc="http://schemas.openxmlformats.org/markup-compatibility/2006">
               <mc:Choice xmlns:v="urn:schemas-microsoft-com:vml" Requires="v">
-                <p:oleObj spid="_x0000_s187498" name="Equation" r:id="rId4" imgW="114120" imgH="177480" progId="Equation.DSMT4">
+                <p:oleObj spid="_x0000_s187507" name="Equation" r:id="rId4" imgW="114120" imgH="177480" progId="Equation.DSMT4">
                   <p:embed/>
                 </p:oleObj>
               </mc:Choice>
@@ -14246,666 +14327,681 @@
           </a:graphicData>
         </a:graphic>
       </p:graphicFrame>
-      <p:sp>
-        <p:nvSpPr>
-          <p:cNvPr id="8198" name="AutoShape 76"/>
-          <p:cNvSpPr>
-            <a:spLocks noChangeArrowheads="1"/>
-          </p:cNvSpPr>
+      <p:grpSp>
+        <p:nvGrpSpPr>
+          <p:cNvPr id="2" name="Group 1"/>
+          <p:cNvGrpSpPr/>
           <p:nvPr/>
-        </p:nvSpPr>
-        <p:spPr bwMode="auto">
+        </p:nvGrpSpPr>
+        <p:grpSpPr>
           <a:xfrm>
-            <a:off x="5065713" y="1928813"/>
-            <a:ext cx="1519237" cy="2606675"/>
+            <a:off x="1982788" y="1928813"/>
+            <a:ext cx="5118100" cy="4410075"/>
+            <a:chOff x="1982788" y="1928813"/>
+            <a:chExt cx="5118100" cy="4410075"/>
           </a:xfrm>
-          <a:prstGeom prst="rtTriangle">
-            <a:avLst/>
-          </a:prstGeom>
-          <a:solidFill>
-            <a:schemeClr val="bg2"/>
-          </a:solidFill>
-          <a:ln w="9525">
+        </p:grpSpPr>
+        <p:sp>
+          <p:nvSpPr>
+            <p:cNvPr id="8198" name="AutoShape 76"/>
+            <p:cNvSpPr>
+              <a:spLocks noChangeArrowheads="1"/>
+            </p:cNvSpPr>
+            <p:nvPr/>
+          </p:nvSpPr>
+          <p:spPr bwMode="auto">
+            <a:xfrm>
+              <a:off x="5065713" y="1928813"/>
+              <a:ext cx="1519237" cy="2606675"/>
+            </a:xfrm>
+            <a:prstGeom prst="rtTriangle">
+              <a:avLst/>
+            </a:prstGeom>
             <a:solidFill>
-              <a:schemeClr val="tx1"/>
+              <a:schemeClr val="bg2"/>
             </a:solidFill>
-            <a:miter lim="800000"/>
-            <a:headEnd/>
-            <a:tailEnd/>
-          </a:ln>
-        </p:spPr>
-        <p:txBody>
-          <a:bodyPr wrap="none" anchor="ctr"/>
-          <a:lstStyle/>
-          <a:p>
-            <a:endParaRPr lang="en-US">
-              <a:latin typeface="Comic Sans MS" pitchFamily="66" charset="0"/>
-            </a:endParaRPr>
-          </a:p>
-        </p:txBody>
-      </p:sp>
-      <p:sp>
-        <p:nvSpPr>
-          <p:cNvPr id="8199" name="AutoShape 77"/>
-          <p:cNvSpPr>
-            <a:spLocks noChangeArrowheads="1"/>
-          </p:cNvSpPr>
-          <p:nvPr/>
-        </p:nvSpPr>
-        <p:spPr bwMode="auto">
-          <a:xfrm rot="10800000">
-            <a:off x="5065713" y="1928813"/>
-            <a:ext cx="1519237" cy="2606675"/>
-          </a:xfrm>
-          <a:prstGeom prst="rtTriangle">
-            <a:avLst/>
-          </a:prstGeom>
-          <a:solidFill>
-            <a:schemeClr val="accent2"/>
-          </a:solidFill>
-          <a:ln w="9525">
+            <a:ln w="9525">
+              <a:solidFill>
+                <a:schemeClr val="tx1"/>
+              </a:solidFill>
+              <a:miter lim="800000"/>
+              <a:headEnd/>
+              <a:tailEnd/>
+            </a:ln>
+          </p:spPr>
+          <p:txBody>
+            <a:bodyPr wrap="none" anchor="ctr"/>
+            <a:lstStyle/>
+            <a:p>
+              <a:endParaRPr lang="en-US">
+                <a:latin typeface="Comic Sans MS" pitchFamily="66" charset="0"/>
+              </a:endParaRPr>
+            </a:p>
+          </p:txBody>
+        </p:sp>
+        <p:sp>
+          <p:nvSpPr>
+            <p:cNvPr id="8199" name="AutoShape 77"/>
+            <p:cNvSpPr>
+              <a:spLocks noChangeArrowheads="1"/>
+            </p:cNvSpPr>
+            <p:nvPr/>
+          </p:nvSpPr>
+          <p:spPr bwMode="auto">
+            <a:xfrm rot="10800000">
+              <a:off x="5065713" y="1928813"/>
+              <a:ext cx="1519237" cy="2606675"/>
+            </a:xfrm>
+            <a:prstGeom prst="rtTriangle">
+              <a:avLst/>
+            </a:prstGeom>
             <a:solidFill>
-              <a:schemeClr val="tx1"/>
+              <a:schemeClr val="accent2"/>
             </a:solidFill>
-            <a:miter lim="800000"/>
-            <a:headEnd/>
-            <a:tailEnd/>
-          </a:ln>
-        </p:spPr>
-        <p:txBody>
-          <a:bodyPr wrap="none" anchor="ctr"/>
-          <a:lstStyle/>
-          <a:p>
-            <a:endParaRPr lang="en-US">
-              <a:latin typeface="Comic Sans MS" pitchFamily="66" charset="0"/>
-            </a:endParaRPr>
-          </a:p>
-        </p:txBody>
-      </p:sp>
-      <p:sp>
-        <p:nvSpPr>
-          <p:cNvPr id="8200" name="AutoShape 78"/>
-          <p:cNvSpPr>
-            <a:spLocks noChangeArrowheads="1"/>
-          </p:cNvSpPr>
-          <p:nvPr/>
-        </p:nvSpPr>
-        <p:spPr bwMode="auto">
-          <a:xfrm rot="-5400000">
-            <a:off x="2996407" y="1362869"/>
-            <a:ext cx="1503362" cy="2635250"/>
-          </a:xfrm>
-          <a:prstGeom prst="rtTriangle">
-            <a:avLst/>
-          </a:prstGeom>
-          <a:solidFill>
-            <a:schemeClr val="folHlink"/>
-          </a:solidFill>
-          <a:ln w="9525">
+            <a:ln w="9525">
+              <a:solidFill>
+                <a:schemeClr val="tx1"/>
+              </a:solidFill>
+              <a:miter lim="800000"/>
+              <a:headEnd/>
+              <a:tailEnd/>
+            </a:ln>
+          </p:spPr>
+          <p:txBody>
+            <a:bodyPr wrap="none" anchor="ctr"/>
+            <a:lstStyle/>
+            <a:p>
+              <a:endParaRPr lang="en-US">
+                <a:latin typeface="Comic Sans MS" pitchFamily="66" charset="0"/>
+              </a:endParaRPr>
+            </a:p>
+          </p:txBody>
+        </p:sp>
+        <p:sp>
+          <p:nvSpPr>
+            <p:cNvPr id="8200" name="AutoShape 78"/>
+            <p:cNvSpPr>
+              <a:spLocks noChangeArrowheads="1"/>
+            </p:cNvSpPr>
+            <p:nvPr/>
+          </p:nvSpPr>
+          <p:spPr bwMode="auto">
+            <a:xfrm rot="16200000">
+              <a:off x="2996407" y="1362869"/>
+              <a:ext cx="1503362" cy="2635250"/>
+            </a:xfrm>
+            <a:prstGeom prst="rtTriangle">
+              <a:avLst/>
+            </a:prstGeom>
             <a:solidFill>
-              <a:schemeClr val="tx1"/>
+              <a:schemeClr val="folHlink"/>
             </a:solidFill>
-            <a:miter lim="800000"/>
-            <a:headEnd/>
-            <a:tailEnd/>
-          </a:ln>
-        </p:spPr>
-        <p:txBody>
-          <a:bodyPr wrap="none" anchor="ctr"/>
-          <a:lstStyle/>
-          <a:p>
-            <a:endParaRPr lang="en-US">
-              <a:latin typeface="Comic Sans MS" pitchFamily="66" charset="0"/>
-            </a:endParaRPr>
-          </a:p>
-        </p:txBody>
-      </p:sp>
-      <p:sp>
-        <p:nvSpPr>
-          <p:cNvPr id="8201" name="AutoShape 79"/>
-          <p:cNvSpPr>
-            <a:spLocks noChangeArrowheads="1"/>
-          </p:cNvSpPr>
-          <p:nvPr/>
-        </p:nvSpPr>
-        <p:spPr bwMode="auto">
-          <a:xfrm rot="5400000">
-            <a:off x="2996407" y="1362869"/>
-            <a:ext cx="1503362" cy="2635250"/>
-          </a:xfrm>
-          <a:prstGeom prst="rtTriangle">
-            <a:avLst/>
-          </a:prstGeom>
-          <a:solidFill>
-            <a:srgbClr val="DDDDDD">
-              <a:alpha val="89803"/>
-            </a:srgbClr>
-          </a:solidFill>
-          <a:ln w="9525">
+            <a:ln w="9525">
+              <a:solidFill>
+                <a:schemeClr val="tx1"/>
+              </a:solidFill>
+              <a:miter lim="800000"/>
+              <a:headEnd/>
+              <a:tailEnd/>
+            </a:ln>
+          </p:spPr>
+          <p:txBody>
+            <a:bodyPr wrap="none" anchor="ctr"/>
+            <a:lstStyle/>
+            <a:p>
+              <a:endParaRPr lang="en-US">
+                <a:latin typeface="Comic Sans MS" pitchFamily="66" charset="0"/>
+              </a:endParaRPr>
+            </a:p>
+          </p:txBody>
+        </p:sp>
+        <p:sp>
+          <p:nvSpPr>
+            <p:cNvPr id="8201" name="AutoShape 79"/>
+            <p:cNvSpPr>
+              <a:spLocks noChangeArrowheads="1"/>
+            </p:cNvSpPr>
+            <p:nvPr/>
+          </p:nvSpPr>
+          <p:spPr bwMode="auto">
+            <a:xfrm rot="5400000">
+              <a:off x="2996407" y="1362869"/>
+              <a:ext cx="1503362" cy="2635250"/>
+            </a:xfrm>
+            <a:prstGeom prst="rtTriangle">
+              <a:avLst/>
+            </a:prstGeom>
             <a:solidFill>
-              <a:schemeClr val="tx1"/>
+              <a:srgbClr val="DDDDDD">
+                <a:alpha val="89803"/>
+              </a:srgbClr>
             </a:solidFill>
-            <a:miter lim="800000"/>
-            <a:headEnd/>
-            <a:tailEnd/>
-          </a:ln>
-        </p:spPr>
-        <p:txBody>
-          <a:bodyPr wrap="none" anchor="ctr"/>
-          <a:lstStyle/>
-          <a:p>
-            <a:endParaRPr lang="en-US">
-              <a:latin typeface="Comic Sans MS" pitchFamily="66" charset="0"/>
-            </a:endParaRPr>
-          </a:p>
-        </p:txBody>
-      </p:sp>
-      <p:sp>
-        <p:nvSpPr>
-          <p:cNvPr id="8202" name="Line 89"/>
-          <p:cNvSpPr>
-            <a:spLocks noChangeShapeType="1"/>
-          </p:cNvSpPr>
-          <p:nvPr/>
-        </p:nvSpPr>
-        <p:spPr bwMode="auto">
-          <a:xfrm>
-            <a:off x="5470525" y="6338888"/>
-            <a:ext cx="0" cy="0"/>
-          </a:xfrm>
-          <a:prstGeom prst="line">
-            <a:avLst/>
-          </a:prstGeom>
-          <a:noFill/>
-          <a:ln w="9525">
+            <a:ln w="9525">
+              <a:solidFill>
+                <a:schemeClr val="tx1"/>
+              </a:solidFill>
+              <a:miter lim="800000"/>
+              <a:headEnd/>
+              <a:tailEnd/>
+            </a:ln>
+          </p:spPr>
+          <p:txBody>
+            <a:bodyPr wrap="none" anchor="ctr"/>
+            <a:lstStyle/>
+            <a:p>
+              <a:endParaRPr lang="en-US">
+                <a:latin typeface="Comic Sans MS" pitchFamily="66" charset="0"/>
+              </a:endParaRPr>
+            </a:p>
+          </p:txBody>
+        </p:sp>
+        <p:sp>
+          <p:nvSpPr>
+            <p:cNvPr id="8202" name="Line 89"/>
+            <p:cNvSpPr>
+              <a:spLocks noChangeShapeType="1"/>
+            </p:cNvSpPr>
+            <p:nvPr/>
+          </p:nvSpPr>
+          <p:spPr bwMode="auto">
+            <a:xfrm>
+              <a:off x="5470525" y="6338888"/>
+              <a:ext cx="0" cy="0"/>
+            </a:xfrm>
+            <a:prstGeom prst="line">
+              <a:avLst/>
+            </a:prstGeom>
+            <a:noFill/>
+            <a:ln w="9525">
+              <a:solidFill>
+                <a:schemeClr val="tx1"/>
+              </a:solidFill>
+              <a:round/>
+              <a:headEnd/>
+              <a:tailEnd/>
+            </a:ln>
+          </p:spPr>
+          <p:txBody>
+            <a:bodyPr/>
+            <a:lstStyle/>
+            <a:p>
+              <a:endParaRPr lang="en-US"/>
+            </a:p>
+          </p:txBody>
+        </p:sp>
+        <p:sp>
+          <p:nvSpPr>
+            <p:cNvPr id="8203" name="Line 90"/>
+            <p:cNvSpPr>
+              <a:spLocks noChangeShapeType="1"/>
+            </p:cNvSpPr>
+            <p:nvPr/>
+          </p:nvSpPr>
+          <p:spPr bwMode="auto">
+            <a:xfrm>
+              <a:off x="5470525" y="6338888"/>
+              <a:ext cx="0" cy="0"/>
+            </a:xfrm>
+            <a:prstGeom prst="line">
+              <a:avLst/>
+            </a:prstGeom>
+            <a:noFill/>
+            <a:ln w="9525">
+              <a:solidFill>
+                <a:schemeClr val="tx1"/>
+              </a:solidFill>
+              <a:round/>
+              <a:headEnd/>
+              <a:tailEnd/>
+            </a:ln>
+          </p:spPr>
+          <p:txBody>
+            <a:bodyPr/>
+            <a:lstStyle/>
+            <a:p>
+              <a:endParaRPr lang="en-US"/>
+            </a:p>
+          </p:txBody>
+        </p:sp>
+        <p:sp>
+          <p:nvSpPr>
+            <p:cNvPr id="8204" name="Line 103"/>
+            <p:cNvSpPr>
+              <a:spLocks noChangeShapeType="1"/>
+            </p:cNvSpPr>
+            <p:nvPr/>
+          </p:nvSpPr>
+          <p:spPr bwMode="auto">
+            <a:xfrm flipV="1">
+              <a:off x="4051300" y="4535488"/>
+              <a:ext cx="1014413" cy="0"/>
+            </a:xfrm>
+            <a:prstGeom prst="line">
+              <a:avLst/>
+            </a:prstGeom>
+            <a:noFill/>
+            <a:ln w="9525">
+              <a:solidFill>
+                <a:schemeClr val="tx1"/>
+              </a:solidFill>
+              <a:round/>
+              <a:headEnd/>
+              <a:tailEnd/>
+            </a:ln>
+          </p:spPr>
+          <p:txBody>
+            <a:bodyPr/>
+            <a:lstStyle/>
+            <a:p>
+              <a:endParaRPr lang="en-US"/>
+            </a:p>
+          </p:txBody>
+        </p:sp>
+        <p:sp>
+          <p:nvSpPr>
+            <p:cNvPr id="8205" name="Line 104"/>
+            <p:cNvSpPr>
+              <a:spLocks noChangeShapeType="1"/>
+            </p:cNvSpPr>
+            <p:nvPr/>
+          </p:nvSpPr>
+          <p:spPr bwMode="auto">
+            <a:xfrm flipV="1">
+              <a:off x="4051300" y="3432175"/>
+              <a:ext cx="0" cy="1103313"/>
+            </a:xfrm>
+            <a:prstGeom prst="line">
+              <a:avLst/>
+            </a:prstGeom>
+            <a:noFill/>
+            <a:ln w="9525">
+              <a:solidFill>
+                <a:schemeClr val="tx1"/>
+              </a:solidFill>
+              <a:round/>
+              <a:headEnd/>
+              <a:tailEnd/>
+            </a:ln>
+          </p:spPr>
+          <p:txBody>
+            <a:bodyPr/>
+            <a:lstStyle/>
+            <a:p>
+              <a:endParaRPr lang="en-US"/>
+            </a:p>
+          </p:txBody>
+        </p:sp>
+        <p:sp>
+          <p:nvSpPr>
+            <p:cNvPr id="8206" name="Text Box 109"/>
+            <p:cNvSpPr txBox="1">
+              <a:spLocks noChangeArrowheads="1"/>
+            </p:cNvSpPr>
+            <p:nvPr/>
+          </p:nvSpPr>
+          <p:spPr bwMode="auto">
+            <a:xfrm>
+              <a:off x="6584950" y="2930525"/>
+              <a:ext cx="515938" cy="523875"/>
+            </a:xfrm>
+            <a:prstGeom prst="rect">
+              <a:avLst/>
+            </a:prstGeom>
+            <a:noFill/>
+            <a:ln w="9525">
+              <a:noFill/>
+              <a:miter lim="800000"/>
+              <a:headEnd/>
+              <a:tailEnd/>
+            </a:ln>
+          </p:spPr>
+          <p:txBody>
+            <a:bodyPr>
+              <a:spAutoFit/>
+            </a:bodyPr>
+            <a:lstStyle/>
+            <a:p>
+              <a:r>
+                <a:rPr lang="en-US" sz="2800" b="1">
+                  <a:latin typeface="Comic Sans MS" pitchFamily="66" charset="0"/>
+                </a:rPr>
+                <a:t>b</a:t>
+              </a:r>
+            </a:p>
+          </p:txBody>
+        </p:sp>
+        <p:sp>
+          <p:nvSpPr>
+            <p:cNvPr id="8207" name="Text Box 129"/>
+            <p:cNvSpPr txBox="1">
+              <a:spLocks noChangeArrowheads="1"/>
+            </p:cNvSpPr>
+            <p:nvPr/>
+          </p:nvSpPr>
+          <p:spPr bwMode="auto">
+            <a:xfrm>
+              <a:off x="1982788" y="2298700"/>
+              <a:ext cx="384175" cy="522288"/>
+            </a:xfrm>
+            <a:prstGeom prst="rect">
+              <a:avLst/>
+            </a:prstGeom>
+            <a:noFill/>
+            <a:ln w="9525">
+              <a:noFill/>
+              <a:miter lim="800000"/>
+              <a:headEnd/>
+              <a:tailEnd type="none" w="lg" len="lg"/>
+            </a:ln>
+          </p:spPr>
+          <p:txBody>
+            <a:bodyPr wrap="none">
+              <a:spAutoFit/>
+            </a:bodyPr>
+            <a:lstStyle/>
+            <a:p>
+              <a:r>
+                <a:rPr lang="en-US" sz="2800" b="1">
+                  <a:latin typeface="Comic Sans MS" pitchFamily="66" charset="0"/>
+                </a:rPr>
+                <a:t>a</a:t>
+              </a:r>
+            </a:p>
+          </p:txBody>
+        </p:sp>
+        <p:sp>
+          <p:nvSpPr>
+            <p:cNvPr id="8208" name="Text Box 130"/>
+            <p:cNvSpPr txBox="1">
+              <a:spLocks noChangeArrowheads="1"/>
+            </p:cNvSpPr>
+            <p:nvPr/>
+          </p:nvSpPr>
+          <p:spPr bwMode="auto">
+            <a:xfrm>
+              <a:off x="2995613" y="3363913"/>
+              <a:ext cx="384175" cy="523875"/>
+            </a:xfrm>
+            <a:prstGeom prst="rect">
+              <a:avLst/>
+            </a:prstGeom>
+            <a:noFill/>
+            <a:ln w="9525">
+              <a:noFill/>
+              <a:miter lim="800000"/>
+              <a:headEnd/>
+              <a:tailEnd type="none" w="lg" len="lg"/>
+            </a:ln>
+          </p:spPr>
+          <p:txBody>
+            <a:bodyPr wrap="none">
+              <a:spAutoFit/>
+            </a:bodyPr>
+            <a:lstStyle/>
+            <a:p>
+              <a:r>
+                <a:rPr lang="en-US" sz="2800" b="1" dirty="0">
+                  <a:latin typeface="Comic Sans MS" pitchFamily="66" charset="0"/>
+                </a:rPr>
+                <a:t>a</a:t>
+              </a:r>
+            </a:p>
+          </p:txBody>
+        </p:sp>
+        <p:sp>
+          <p:nvSpPr>
+            <p:cNvPr id="8209" name="Line 132"/>
+            <p:cNvSpPr>
+              <a:spLocks noChangeShapeType="1"/>
+            </p:cNvSpPr>
+            <p:nvPr/>
+          </p:nvSpPr>
+          <p:spPr bwMode="auto">
+            <a:xfrm flipV="1">
+              <a:off x="3951288" y="1928813"/>
+              <a:ext cx="0" cy="1503362"/>
+            </a:xfrm>
+            <a:prstGeom prst="line">
+              <a:avLst/>
+            </a:prstGeom>
+            <a:noFill/>
+            <a:ln w="38100">
+              <a:solidFill>
+                <a:schemeClr val="tx1"/>
+              </a:solidFill>
+              <a:prstDash val="sysDot"/>
+              <a:round/>
+              <a:headEnd/>
+              <a:tailEnd type="none" w="lg" len="lg"/>
+            </a:ln>
+          </p:spPr>
+          <p:txBody>
+            <a:bodyPr/>
+            <a:lstStyle/>
+            <a:p>
+              <a:endParaRPr lang="en-US"/>
+            </a:p>
+          </p:txBody>
+        </p:sp>
+        <p:sp>
+          <p:nvSpPr>
+            <p:cNvPr id="8210" name="Rectangle 133"/>
+            <p:cNvSpPr>
+              <a:spLocks noChangeArrowheads="1"/>
+            </p:cNvSpPr>
+            <p:nvPr/>
+          </p:nvSpPr>
+          <p:spPr bwMode="auto">
+            <a:xfrm>
+              <a:off x="3952875" y="3449638"/>
+              <a:ext cx="1093788" cy="1081087"/>
+            </a:xfrm>
+            <a:prstGeom prst="rect">
+              <a:avLst/>
+            </a:prstGeom>
             <a:solidFill>
-              <a:schemeClr val="tx1"/>
+              <a:srgbClr val="FFFF00"/>
             </a:solidFill>
-            <a:round/>
-            <a:headEnd/>
-            <a:tailEnd/>
-          </a:ln>
-        </p:spPr>
-        <p:txBody>
-          <a:bodyPr/>
-          <a:lstStyle/>
-          <a:p>
-            <a:endParaRPr lang="en-US"/>
-          </a:p>
-        </p:txBody>
-      </p:sp>
-      <p:sp>
-        <p:nvSpPr>
-          <p:cNvPr id="8203" name="Line 90"/>
-          <p:cNvSpPr>
-            <a:spLocks noChangeShapeType="1"/>
-          </p:cNvSpPr>
-          <p:nvPr/>
-        </p:nvSpPr>
-        <p:spPr bwMode="auto">
-          <a:xfrm>
-            <a:off x="5470525" y="6338888"/>
-            <a:ext cx="0" cy="0"/>
-          </a:xfrm>
-          <a:prstGeom prst="line">
-            <a:avLst/>
-          </a:prstGeom>
-          <a:noFill/>
-          <a:ln w="9525">
-            <a:solidFill>
-              <a:schemeClr val="tx1"/>
-            </a:solidFill>
-            <a:round/>
-            <a:headEnd/>
-            <a:tailEnd/>
-          </a:ln>
-        </p:spPr>
-        <p:txBody>
-          <a:bodyPr/>
-          <a:lstStyle/>
-          <a:p>
-            <a:endParaRPr lang="en-US"/>
-          </a:p>
-        </p:txBody>
-      </p:sp>
-      <p:sp>
-        <p:nvSpPr>
-          <p:cNvPr id="8204" name="Line 103"/>
-          <p:cNvSpPr>
-            <a:spLocks noChangeShapeType="1"/>
-          </p:cNvSpPr>
-          <p:nvPr/>
-        </p:nvSpPr>
-        <p:spPr bwMode="auto">
-          <a:xfrm flipV="1">
-            <a:off x="4051300" y="4535488"/>
-            <a:ext cx="1014413" cy="0"/>
-          </a:xfrm>
-          <a:prstGeom prst="line">
-            <a:avLst/>
-          </a:prstGeom>
-          <a:noFill/>
-          <a:ln w="9525">
-            <a:solidFill>
-              <a:schemeClr val="tx1"/>
-            </a:solidFill>
-            <a:round/>
-            <a:headEnd/>
-            <a:tailEnd/>
-          </a:ln>
-        </p:spPr>
-        <p:txBody>
-          <a:bodyPr/>
-          <a:lstStyle/>
-          <a:p>
-            <a:endParaRPr lang="en-US"/>
-          </a:p>
-        </p:txBody>
-      </p:sp>
-      <p:sp>
-        <p:nvSpPr>
-          <p:cNvPr id="8205" name="Line 104"/>
-          <p:cNvSpPr>
-            <a:spLocks noChangeShapeType="1"/>
-          </p:cNvSpPr>
-          <p:nvPr/>
-        </p:nvSpPr>
-        <p:spPr bwMode="auto">
-          <a:xfrm flipV="1">
-            <a:off x="4051300" y="3432175"/>
-            <a:ext cx="0" cy="1103313"/>
-          </a:xfrm>
-          <a:prstGeom prst="line">
-            <a:avLst/>
-          </a:prstGeom>
-          <a:noFill/>
-          <a:ln w="9525">
-            <a:solidFill>
-              <a:schemeClr val="tx1"/>
-            </a:solidFill>
-            <a:round/>
-            <a:headEnd/>
-            <a:tailEnd/>
-          </a:ln>
-        </p:spPr>
-        <p:txBody>
-          <a:bodyPr/>
-          <a:lstStyle/>
-          <a:p>
-            <a:endParaRPr lang="en-US"/>
-          </a:p>
-        </p:txBody>
-      </p:sp>
-      <p:sp>
-        <p:nvSpPr>
-          <p:cNvPr id="8206" name="Text Box 109"/>
-          <p:cNvSpPr txBox="1">
-            <a:spLocks noChangeArrowheads="1"/>
-          </p:cNvSpPr>
-          <p:nvPr/>
-        </p:nvSpPr>
-        <p:spPr bwMode="auto">
-          <a:xfrm>
-            <a:off x="6584950" y="2930525"/>
-            <a:ext cx="515938" cy="523875"/>
-          </a:xfrm>
-          <a:prstGeom prst="rect">
-            <a:avLst/>
-          </a:prstGeom>
-          <a:noFill/>
-          <a:ln w="9525">
+            <a:ln w="9525">
+              <a:solidFill>
+                <a:schemeClr val="tx1"/>
+              </a:solidFill>
+              <a:miter lim="800000"/>
+              <a:headEnd/>
+              <a:tailEnd type="none" w="lg" len="lg"/>
+            </a:ln>
+          </p:spPr>
+          <p:txBody>
+            <a:bodyPr wrap="none" anchor="ctr"/>
+            <a:lstStyle/>
+            <a:p>
+              <a:endParaRPr lang="en-US">
+                <a:latin typeface="Comic Sans MS" pitchFamily="66" charset="0"/>
+              </a:endParaRPr>
+            </a:p>
+          </p:txBody>
+        </p:sp>
+        <p:sp>
+          <p:nvSpPr>
+            <p:cNvPr id="8211" name="AutoShape 136"/>
+            <p:cNvSpPr>
+              <a:spLocks noChangeAspect="1" noChangeArrowheads="1" noTextEdit="1"/>
+            </p:cNvSpPr>
+            <p:nvPr/>
+          </p:nvSpPr>
+          <p:spPr bwMode="auto">
+            <a:xfrm>
+              <a:off x="3392488" y="4244975"/>
+              <a:ext cx="2620962" cy="1376363"/>
+            </a:xfrm>
+            <a:prstGeom prst="rect">
+              <a:avLst/>
+            </a:prstGeom>
             <a:noFill/>
-            <a:miter lim="800000"/>
-            <a:headEnd/>
-            <a:tailEnd/>
-          </a:ln>
-        </p:spPr>
-        <p:txBody>
-          <a:bodyPr>
-            <a:spAutoFit/>
-          </a:bodyPr>
-          <a:lstStyle/>
-          <a:p>
-            <a:r>
-              <a:rPr lang="en-US" sz="2800" b="1">
-                <a:latin typeface="Comic Sans MS" pitchFamily="66" charset="0"/>
-              </a:rPr>
-              <a:t>b</a:t>
-            </a:r>
-          </a:p>
-        </p:txBody>
-      </p:sp>
-      <p:sp>
-        <p:nvSpPr>
-          <p:cNvPr id="8207" name="Text Box 129"/>
-          <p:cNvSpPr txBox="1">
-            <a:spLocks noChangeArrowheads="1"/>
-          </p:cNvSpPr>
-          <p:nvPr/>
-        </p:nvSpPr>
-        <p:spPr bwMode="auto">
-          <a:xfrm>
-            <a:off x="1982788" y="2298700"/>
-            <a:ext cx="384175" cy="522288"/>
-          </a:xfrm>
-          <a:prstGeom prst="rect">
-            <a:avLst/>
-          </a:prstGeom>
-          <a:noFill/>
-          <a:ln w="9525">
+            <a:ln w="9525">
+              <a:noFill/>
+              <a:miter lim="800000"/>
+              <a:headEnd/>
+              <a:tailEnd/>
+            </a:ln>
+          </p:spPr>
+          <p:txBody>
+            <a:bodyPr/>
+            <a:lstStyle/>
+            <a:p>
+              <a:endParaRPr lang="en-US"/>
+            </a:p>
+          </p:txBody>
+        </p:sp>
+        <p:sp>
+          <p:nvSpPr>
+            <p:cNvPr id="8212" name="Text Box 142"/>
+            <p:cNvSpPr txBox="1">
+              <a:spLocks noChangeArrowheads="1"/>
+            </p:cNvSpPr>
+            <p:nvPr/>
+          </p:nvSpPr>
+          <p:spPr bwMode="auto">
+            <a:xfrm>
+              <a:off x="5462588" y="3919538"/>
+              <a:ext cx="382587" cy="522287"/>
+            </a:xfrm>
+            <a:prstGeom prst="rect">
+              <a:avLst/>
+            </a:prstGeom>
             <a:noFill/>
-            <a:miter lim="800000"/>
-            <a:headEnd/>
-            <a:tailEnd type="none" w="lg" len="lg"/>
-          </a:ln>
-        </p:spPr>
-        <p:txBody>
-          <a:bodyPr wrap="none">
-            <a:spAutoFit/>
-          </a:bodyPr>
-          <a:lstStyle/>
-          <a:p>
-            <a:r>
-              <a:rPr lang="en-US" sz="2800" b="1">
-                <a:latin typeface="Comic Sans MS" pitchFamily="66" charset="0"/>
-              </a:rPr>
-              <a:t>a</a:t>
-            </a:r>
-          </a:p>
-        </p:txBody>
-      </p:sp>
-      <p:sp>
-        <p:nvSpPr>
-          <p:cNvPr id="8208" name="Text Box 130"/>
-          <p:cNvSpPr txBox="1">
-            <a:spLocks noChangeArrowheads="1"/>
-          </p:cNvSpPr>
-          <p:nvPr/>
-        </p:nvSpPr>
-        <p:spPr bwMode="auto">
-          <a:xfrm>
-            <a:off x="2995613" y="3363913"/>
-            <a:ext cx="384175" cy="523875"/>
-          </a:xfrm>
-          <a:prstGeom prst="rect">
-            <a:avLst/>
-          </a:prstGeom>
-          <a:noFill/>
-          <a:ln w="9525">
+            <a:ln w="9525">
+              <a:noFill/>
+              <a:miter lim="800000"/>
+              <a:headEnd/>
+              <a:tailEnd type="none" w="lg" len="lg"/>
+            </a:ln>
+          </p:spPr>
+          <p:txBody>
+            <a:bodyPr wrap="none">
+              <a:spAutoFit/>
+            </a:bodyPr>
+            <a:lstStyle/>
+            <a:p>
+              <a:r>
+                <a:rPr lang="en-US" sz="2800" b="1">
+                  <a:latin typeface="Comic Sans MS" pitchFamily="66" charset="0"/>
+                </a:rPr>
+                <a:t>a</a:t>
+              </a:r>
+            </a:p>
+          </p:txBody>
+        </p:sp>
+        <p:sp>
+          <p:nvSpPr>
+            <p:cNvPr id="8213" name="Text Box 143"/>
+            <p:cNvSpPr txBox="1">
+              <a:spLocks noChangeArrowheads="1"/>
+            </p:cNvSpPr>
+            <p:nvPr/>
+          </p:nvSpPr>
+          <p:spPr bwMode="auto">
+            <a:xfrm>
+              <a:off x="4083050" y="3935413"/>
+              <a:ext cx="817563" cy="523875"/>
+            </a:xfrm>
+            <a:prstGeom prst="rect">
+              <a:avLst/>
+            </a:prstGeom>
             <a:noFill/>
-            <a:miter lim="800000"/>
-            <a:headEnd/>
-            <a:tailEnd type="none" w="lg" len="lg"/>
-          </a:ln>
-        </p:spPr>
-        <p:txBody>
-          <a:bodyPr wrap="none">
-            <a:spAutoFit/>
-          </a:bodyPr>
-          <a:lstStyle/>
-          <a:p>
-            <a:r>
-              <a:rPr lang="en-US" sz="2800" b="1" dirty="0">
-                <a:latin typeface="Comic Sans MS" pitchFamily="66" charset="0"/>
-              </a:rPr>
-              <a:t>a</a:t>
-            </a:r>
-          </a:p>
-        </p:txBody>
-      </p:sp>
-      <p:sp>
-        <p:nvSpPr>
-          <p:cNvPr id="8209" name="Line 132"/>
-          <p:cNvSpPr>
-            <a:spLocks noChangeShapeType="1"/>
-          </p:cNvSpPr>
-          <p:nvPr/>
-        </p:nvSpPr>
-        <p:spPr bwMode="auto">
-          <a:xfrm flipV="1">
-            <a:off x="3951288" y="1928813"/>
-            <a:ext cx="0" cy="1503362"/>
-          </a:xfrm>
-          <a:prstGeom prst="line">
-            <a:avLst/>
-          </a:prstGeom>
-          <a:noFill/>
-          <a:ln w="38100">
-            <a:solidFill>
-              <a:schemeClr val="tx1"/>
-            </a:solidFill>
-            <a:prstDash val="sysDot"/>
-            <a:round/>
-            <a:headEnd/>
-            <a:tailEnd type="none" w="lg" len="lg"/>
-          </a:ln>
-        </p:spPr>
-        <p:txBody>
-          <a:bodyPr/>
-          <a:lstStyle/>
-          <a:p>
-            <a:endParaRPr lang="en-US"/>
-          </a:p>
-        </p:txBody>
-      </p:sp>
-      <p:sp>
-        <p:nvSpPr>
-          <p:cNvPr id="8210" name="Rectangle 133"/>
-          <p:cNvSpPr>
-            <a:spLocks noChangeArrowheads="1"/>
-          </p:cNvSpPr>
-          <p:nvPr/>
-        </p:nvSpPr>
-        <p:spPr bwMode="auto">
-          <a:xfrm>
-            <a:off x="3952875" y="3449638"/>
-            <a:ext cx="1093788" cy="1081087"/>
-          </a:xfrm>
-          <a:prstGeom prst="rect">
-            <a:avLst/>
-          </a:prstGeom>
-          <a:solidFill>
-            <a:srgbClr val="FFFF00"/>
-          </a:solidFill>
-          <a:ln w="9525">
-            <a:solidFill>
-              <a:schemeClr val="tx1"/>
-            </a:solidFill>
-            <a:miter lim="800000"/>
-            <a:headEnd/>
-            <a:tailEnd type="none" w="lg" len="lg"/>
-          </a:ln>
-        </p:spPr>
-        <p:txBody>
-          <a:bodyPr wrap="none" anchor="ctr"/>
-          <a:lstStyle/>
-          <a:p>
-            <a:endParaRPr lang="en-US">
-              <a:latin typeface="Comic Sans MS" pitchFamily="66" charset="0"/>
-            </a:endParaRPr>
-          </a:p>
-        </p:txBody>
-      </p:sp>
-      <p:sp>
-        <p:nvSpPr>
-          <p:cNvPr id="8211" name="AutoShape 136"/>
-          <p:cNvSpPr>
-            <a:spLocks noChangeAspect="1" noChangeArrowheads="1" noTextEdit="1"/>
-          </p:cNvSpPr>
-          <p:nvPr/>
-        </p:nvSpPr>
-        <p:spPr bwMode="auto">
-          <a:xfrm>
-            <a:off x="3392488" y="4244975"/>
-            <a:ext cx="2620962" cy="1376363"/>
-          </a:xfrm>
-          <a:prstGeom prst="rect">
-            <a:avLst/>
-          </a:prstGeom>
-          <a:noFill/>
-          <a:ln w="9525">
-            <a:noFill/>
-            <a:miter lim="800000"/>
-            <a:headEnd/>
-            <a:tailEnd/>
-          </a:ln>
-        </p:spPr>
-        <p:txBody>
-          <a:bodyPr/>
-          <a:lstStyle/>
-          <a:p>
-            <a:endParaRPr lang="en-US"/>
-          </a:p>
-        </p:txBody>
-      </p:sp>
-      <p:sp>
-        <p:nvSpPr>
-          <p:cNvPr id="8212" name="Text Box 142"/>
-          <p:cNvSpPr txBox="1">
-            <a:spLocks noChangeArrowheads="1"/>
-          </p:cNvSpPr>
-          <p:nvPr/>
-        </p:nvSpPr>
-        <p:spPr bwMode="auto">
-          <a:xfrm>
-            <a:off x="5462588" y="3919538"/>
-            <a:ext cx="382587" cy="522287"/>
-          </a:xfrm>
-          <a:prstGeom prst="rect">
-            <a:avLst/>
-          </a:prstGeom>
-          <a:noFill/>
-          <a:ln w="9525">
-            <a:noFill/>
-            <a:miter lim="800000"/>
-            <a:headEnd/>
-            <a:tailEnd type="none" w="lg" len="lg"/>
-          </a:ln>
-        </p:spPr>
-        <p:txBody>
-          <a:bodyPr wrap="none">
-            <a:spAutoFit/>
-          </a:bodyPr>
-          <a:lstStyle/>
-          <a:p>
-            <a:r>
-              <a:rPr lang="en-US" sz="2800" b="1">
-                <a:latin typeface="Comic Sans MS" pitchFamily="66" charset="0"/>
-              </a:rPr>
-              <a:t>a</a:t>
-            </a:r>
-          </a:p>
-        </p:txBody>
-      </p:sp>
-      <p:sp>
-        <p:nvSpPr>
-          <p:cNvPr id="8213" name="Text Box 143"/>
-          <p:cNvSpPr txBox="1">
-            <a:spLocks noChangeArrowheads="1"/>
-          </p:cNvSpPr>
-          <p:nvPr/>
-        </p:nvSpPr>
-        <p:spPr bwMode="auto">
-          <a:xfrm>
-            <a:off x="4083050" y="3935413"/>
-            <a:ext cx="817563" cy="523875"/>
-          </a:xfrm>
-          <a:prstGeom prst="rect">
-            <a:avLst/>
-          </a:prstGeom>
-          <a:noFill/>
-          <a:ln w="9525">
-            <a:noFill/>
-            <a:miter lim="800000"/>
-            <a:headEnd/>
-            <a:tailEnd type="none" w="lg" len="lg"/>
-          </a:ln>
-        </p:spPr>
-        <p:txBody>
-          <a:bodyPr wrap="none">
-            <a:spAutoFit/>
-          </a:bodyPr>
-          <a:lstStyle/>
-          <a:p>
-            <a:r>
-              <a:rPr lang="en-US" sz="2800" b="1">
-                <a:latin typeface="Comic Sans MS" pitchFamily="66" charset="0"/>
-              </a:rPr>
-              <a:t>b</a:t>
-            </a:r>
-            <a:r>
-              <a:rPr lang="en-US" sz="2800" b="1">
-                <a:latin typeface="Comic Sans MS" pitchFamily="66" charset="0"/>
-                <a:cs typeface="Times New Roman" pitchFamily="18" charset="0"/>
-              </a:rPr>
-              <a:t>-</a:t>
-            </a:r>
-            <a:r>
-              <a:rPr lang="en-US" sz="2800" b="1">
-                <a:latin typeface="Comic Sans MS" pitchFamily="66" charset="0"/>
-              </a:rPr>
-              <a:t>a</a:t>
-            </a:r>
-          </a:p>
-        </p:txBody>
-      </p:sp>
-      <p:graphicFrame>
-        <p:nvGraphicFramePr>
-          <p:cNvPr id="23" name="Object 22"/>
-          <p:cNvGraphicFramePr>
-            <a:graphicFrameLocks noChangeAspect="1"/>
-          </p:cNvGraphicFramePr>
-          <p:nvPr>
-            <p:extLst>
-              <p:ext uri="{D42A27DB-BD31-4B8C-83A1-F6EECF244321}">
-                <p14:modId xmlns:p14="http://schemas.microsoft.com/office/powerpoint/2010/main" val="2176458316"/>
-              </p:ext>
-            </p:extLst>
-          </p:nvPr>
-        </p:nvGraphicFramePr>
-        <p:xfrm>
-          <a:off x="3869748" y="3500582"/>
-          <a:ext cx="2806700" cy="1962150"/>
-        </p:xfrm>
-        <a:graphic>
-          <a:graphicData uri="http://schemas.openxmlformats.org/presentationml/2006/ole">
-            <mc:AlternateContent xmlns:mc="http://schemas.openxmlformats.org/markup-compatibility/2006">
-              <mc:Choice xmlns:v="urn:schemas-microsoft-com:vml" Requires="v">
-                <p:oleObj spid="_x0000_s187499" name="Equation" r:id="rId6" imgW="635000" imgH="444500" progId="Equation.DSMT4">
-                  <p:embed/>
-                </p:oleObj>
-              </mc:Choice>
-              <mc:Fallback>
-                <p:oleObj name="Equation" r:id="rId6" imgW="635000" imgH="444500" progId="Equation.DSMT4">
-                  <p:embed/>
-                  <p:pic>
-                    <p:nvPicPr>
-                      <p:cNvPr id="0" name=""/>
-                      <p:cNvPicPr/>
-                      <p:nvPr/>
-                    </p:nvPicPr>
-                    <p:blipFill>
-                      <a:blip r:embed="rId7"/>
-                      <a:stretch>
-                        <a:fillRect/>
-                      </a:stretch>
-                    </p:blipFill>
-                    <p:spPr>
-                      <a:xfrm>
-                        <a:off x="3869748" y="3500582"/>
-                        <a:ext cx="2806700" cy="1962150"/>
-                      </a:xfrm>
-                      <a:prstGeom prst="rect">
-                        <a:avLst/>
-                      </a:prstGeom>
-                    </p:spPr>
-                  </p:pic>
-                </p:oleObj>
-              </mc:Fallback>
-            </mc:AlternateContent>
-          </a:graphicData>
-        </a:graphic>
-      </p:graphicFrame>
+            <a:ln w="9525">
+              <a:noFill/>
+              <a:miter lim="800000"/>
+              <a:headEnd/>
+              <a:tailEnd type="none" w="lg" len="lg"/>
+            </a:ln>
+          </p:spPr>
+          <p:txBody>
+            <a:bodyPr wrap="none">
+              <a:spAutoFit/>
+            </a:bodyPr>
+            <a:lstStyle/>
+            <a:p>
+              <a:r>
+                <a:rPr lang="en-US" sz="2800" b="1">
+                  <a:latin typeface="Comic Sans MS" pitchFamily="66" charset="0"/>
+                </a:rPr>
+                <a:t>b</a:t>
+              </a:r>
+              <a:r>
+                <a:rPr lang="en-US" sz="2800" b="1">
+                  <a:latin typeface="Comic Sans MS" pitchFamily="66" charset="0"/>
+                  <a:cs typeface="Times New Roman" pitchFamily="18" charset="0"/>
+                </a:rPr>
+                <a:t>-</a:t>
+              </a:r>
+              <a:r>
+                <a:rPr lang="en-US" sz="2800" b="1">
+                  <a:latin typeface="Comic Sans MS" pitchFamily="66" charset="0"/>
+                </a:rPr>
+                <a:t>a</a:t>
+              </a:r>
+            </a:p>
+          </p:txBody>
+        </p:sp>
+        <p:graphicFrame>
+          <p:nvGraphicFramePr>
+            <p:cNvPr id="23" name="Object 22"/>
+            <p:cNvGraphicFramePr>
+              <a:graphicFrameLocks noChangeAspect="1"/>
+            </p:cNvGraphicFramePr>
+            <p:nvPr>
+              <p:extLst>
+                <p:ext uri="{D42A27DB-BD31-4B8C-83A1-F6EECF244321}">
+                  <p14:modId xmlns:p14="http://schemas.microsoft.com/office/powerpoint/2010/main" val="2682600571"/>
+                </p:ext>
+              </p:extLst>
+            </p:nvPr>
+          </p:nvGraphicFramePr>
+          <p:xfrm>
+            <a:off x="3869748" y="3500582"/>
+            <a:ext cx="2806700" cy="1962150"/>
+          </p:xfrm>
+          <a:graphic>
+            <a:graphicData uri="http://schemas.openxmlformats.org/presentationml/2006/ole">
+              <mc:AlternateContent xmlns:mc="http://schemas.openxmlformats.org/markup-compatibility/2006">
+                <mc:Choice xmlns:v="urn:schemas-microsoft-com:vml" Requires="v">
+                  <p:oleObj spid="_x0000_s187508" name="Equation" r:id="rId6" imgW="635000" imgH="444500" progId="Equation.DSMT4">
+                    <p:embed/>
+                  </p:oleObj>
+                </mc:Choice>
+                <mc:Fallback>
+                  <p:oleObj name="Equation" r:id="rId6" imgW="635000" imgH="444500" progId="Equation.DSMT4">
+                    <p:embed/>
+                    <p:pic>
+                      <p:nvPicPr>
+                        <p:cNvPr id="0" name=""/>
+                        <p:cNvPicPr/>
+                        <p:nvPr/>
+                      </p:nvPicPr>
+                      <p:blipFill>
+                        <a:blip r:embed="rId7"/>
+                        <a:stretch>
+                          <a:fillRect/>
+                        </a:stretch>
+                      </p:blipFill>
+                      <p:spPr>
+                        <a:xfrm>
+                          <a:off x="3869748" y="3500582"/>
+                          <a:ext cx="2806700" cy="1962150"/>
+                        </a:xfrm>
+                        <a:prstGeom prst="rect">
+                          <a:avLst/>
+                        </a:prstGeom>
+                      </p:spPr>
+                    </p:pic>
+                  </p:oleObj>
+                </mc:Fallback>
+              </mc:AlternateContent>
+            </a:graphicData>
+          </a:graphic>
+        </p:graphicFrame>
+      </p:grpSp>
     </p:spTree>
     <p:extLst>
       <p:ext uri="{BB962C8B-B14F-4D97-AF65-F5344CB8AC3E}">
@@ -14922,142 +15018,9 @@
   <p:timing>
     <p:tnLst>
       <p:par>
-        <p:cTn xmlns:p14="http://schemas.microsoft.com/office/powerpoint/2010/main" id="1" dur="indefinite" restart="never" nodeType="tmRoot">
-          <p:childTnLst>
-            <p:seq concurrent="1" nextAc="seek">
-              <p:cTn id="2" dur="indefinite" nodeType="mainSeq">
-                <p:childTnLst>
-                  <p:par>
-                    <p:cTn id="3" fill="hold">
-                      <p:stCondLst>
-                        <p:cond delay="indefinite"/>
-                      </p:stCondLst>
-                      <p:childTnLst>
-                        <p:par>
-                          <p:cTn id="4" fill="hold">
-                            <p:stCondLst>
-                              <p:cond delay="0"/>
-                            </p:stCondLst>
-                            <p:childTnLst>
-                              <p:par>
-                                <p:cTn id="5" presetID="22" presetClass="entr" presetSubtype="4" fill="hold" grpId="0" nodeType="clickEffect">
-                                  <p:stCondLst>
-                                    <p:cond delay="0"/>
-                                  </p:stCondLst>
-                                  <p:childTnLst>
-                                    <p:set>
-                                      <p:cBhvr>
-                                        <p:cTn id="6" dur="1" fill="hold">
-                                          <p:stCondLst>
-                                            <p:cond delay="0"/>
-                                          </p:stCondLst>
-                                        </p:cTn>
-                                        <p:tgtEl>
-                                          <p:spTgt spid="8209"/>
-                                        </p:tgtEl>
-                                        <p:attrNameLst>
-                                          <p:attrName>style.visibility</p:attrName>
-                                        </p:attrNameLst>
-                                      </p:cBhvr>
-                                      <p:to>
-                                        <p:strVal val="visible"/>
-                                      </p:to>
-                                    </p:set>
-                                    <p:animEffect transition="in" filter="wipe(down)">
-                                      <p:cBhvr>
-                                        <p:cTn id="7" dur="500"/>
-                                        <p:tgtEl>
-                                          <p:spTgt spid="8209"/>
-                                        </p:tgtEl>
-                                      </p:cBhvr>
-                                    </p:animEffect>
-                                  </p:childTnLst>
-                                </p:cTn>
-                              </p:par>
-                            </p:childTnLst>
-                          </p:cTn>
-                        </p:par>
-                      </p:childTnLst>
-                    </p:cTn>
-                  </p:par>
-                  <p:par>
-                    <p:cTn id="8" fill="hold">
-                      <p:stCondLst>
-                        <p:cond delay="indefinite"/>
-                      </p:stCondLst>
-                      <p:childTnLst>
-                        <p:par>
-                          <p:cTn id="9" fill="hold">
-                            <p:stCondLst>
-                              <p:cond delay="0"/>
-                            </p:stCondLst>
-                            <p:childTnLst>
-                              <p:par>
-                                <p:cTn id="10" presetID="9" presetClass="entr" presetSubtype="0" fill="hold" grpId="0" nodeType="clickEffect">
-                                  <p:stCondLst>
-                                    <p:cond delay="0"/>
-                                  </p:stCondLst>
-                                  <p:childTnLst>
-                                    <p:set>
-                                      <p:cBhvr>
-                                        <p:cTn id="11" dur="1" fill="hold">
-                                          <p:stCondLst>
-                                            <p:cond delay="0"/>
-                                          </p:stCondLst>
-                                        </p:cTn>
-                                        <p:tgtEl>
-                                          <p:spTgt spid="8208"/>
-                                        </p:tgtEl>
-                                        <p:attrNameLst>
-                                          <p:attrName>style.visibility</p:attrName>
-                                        </p:attrNameLst>
-                                      </p:cBhvr>
-                                      <p:to>
-                                        <p:strVal val="visible"/>
-                                      </p:to>
-                                    </p:set>
-                                    <p:animEffect transition="in" filter="dissolve">
-                                      <p:cBhvr>
-                                        <p:cTn id="12" dur="500"/>
-                                        <p:tgtEl>
-                                          <p:spTgt spid="8208"/>
-                                        </p:tgtEl>
-                                      </p:cBhvr>
-                                    </p:animEffect>
-                                  </p:childTnLst>
-                                </p:cTn>
-                              </p:par>
-                            </p:childTnLst>
-                          </p:cTn>
-                        </p:par>
-                      </p:childTnLst>
-                    </p:cTn>
-                  </p:par>
-                </p:childTnLst>
-              </p:cTn>
-              <p:prevCondLst>
-                <p:cond evt="onPrev" delay="0">
-                  <p:tgtEl>
-                    <p:sldTgt/>
-                  </p:tgtEl>
-                </p:cond>
-              </p:prevCondLst>
-              <p:nextCondLst>
-                <p:cond evt="onNext" delay="0">
-                  <p:tgtEl>
-                    <p:sldTgt/>
-                  </p:tgtEl>
-                </p:cond>
-              </p:nextCondLst>
-            </p:seq>
-          </p:childTnLst>
-        </p:cTn>
+        <p:cTn xmlns:p14="http://schemas.microsoft.com/office/powerpoint/2010/main" id="1" dur="indefinite" restart="never" nodeType="tmRoot"/>
       </p:par>
     </p:tnLst>
-    <p:bldLst>
-      <p:bldP spid="8208" grpId="0"/>
-      <p:bldP spid="8209" grpId="0" animBg="1"/>
-    </p:bldLst>
   </p:timing>
 </p:sld>
 </file>
@@ -20061,7 +20024,7 @@
           <a:graphicData uri="http://schemas.openxmlformats.org/presentationml/2006/ole">
             <mc:AlternateContent xmlns:mc="http://schemas.openxmlformats.org/markup-compatibility/2006">
               <mc:Choice xmlns:v="urn:schemas-microsoft-com:vml" Requires="v">
-                <p:oleObj spid="_x0000_s9409" name="Equation" r:id="rId4" imgW="1270000" imgH="457200" progId="Equation.DSMT4">
+                <p:oleObj spid="_x0000_s9419" name="Equation" r:id="rId4" imgW="1270000" imgH="457200" progId="Equation.DSMT4">
                   <p:embed/>
                 </p:oleObj>
               </mc:Choice>
@@ -20156,7 +20119,7 @@
           <a:graphicData uri="http://schemas.openxmlformats.org/presentationml/2006/ole">
             <mc:AlternateContent xmlns:mc="http://schemas.openxmlformats.org/markup-compatibility/2006">
               <mc:Choice xmlns:v="urn:schemas-microsoft-com:vml" Requires="v">
-                <p:oleObj spid="_x0000_s9410" name="Equation" r:id="rId6" imgW="1270000" imgH="457200" progId="Equation.DSMT4">
+                <p:oleObj spid="_x0000_s9420" name="Equation" r:id="rId6" imgW="1270000" imgH="457200" progId="Equation.DSMT4">
                   <p:embed/>
                 </p:oleObj>
               </mc:Choice>
@@ -20323,7 +20286,7 @@
           <a:graphicData uri="http://schemas.openxmlformats.org/presentationml/2006/ole">
             <mc:AlternateContent xmlns:mc="http://schemas.openxmlformats.org/markup-compatibility/2006">
               <mc:Choice xmlns:v="urn:schemas-microsoft-com:vml" Requires="v">
-                <p:oleObj spid="_x0000_s9411" name="Equation" r:id="rId8" imgW="774360" imgH="203040" progId="Equation.DSMT4">
+                <p:oleObj spid="_x0000_s9421" name="Equation" r:id="rId8" imgW="774360" imgH="203040" progId="Equation.DSMT4">
                   <p:embed/>
                 </p:oleObj>
               </mc:Choice>
@@ -20915,7 +20878,7 @@
             <a:graphicData uri="http://schemas.openxmlformats.org/presentationml/2006/ole">
               <mc:AlternateContent xmlns:mc="http://schemas.openxmlformats.org/markup-compatibility/2006">
                 <mc:Choice xmlns:v="urn:schemas-microsoft-com:vml" Requires="v">
-                  <p:oleObj spid="_x0000_s10374" name="Equation" r:id="rId4" imgW="774360" imgH="203040" progId="Equation.DSMT4">
+                  <p:oleObj spid="_x0000_s10381" name="Equation" r:id="rId4" imgW="774360" imgH="203040" progId="Equation.DSMT4">
                     <p:embed/>
                   </p:oleObj>
                 </mc:Choice>
@@ -21080,7 +21043,7 @@
             <a:graphicData uri="http://schemas.openxmlformats.org/presentationml/2006/ole">
               <mc:AlternateContent xmlns:mc="http://schemas.openxmlformats.org/markup-compatibility/2006">
                 <mc:Choice xmlns:v="urn:schemas-microsoft-com:vml" Requires="v">
-                  <p:oleObj spid="_x0000_s10375" name="Equation" r:id="rId6" imgW="736560" imgH="203040" progId="Equation.DSMT4">
+                  <p:oleObj spid="_x0000_s10382" name="Equation" r:id="rId6" imgW="736560" imgH="203040" progId="Equation.DSMT4">
                     <p:embed/>
                   </p:oleObj>
                 </mc:Choice>
@@ -21906,7 +21869,7 @@
           <a:graphicData uri="http://schemas.openxmlformats.org/presentationml/2006/ole">
             <mc:AlternateContent xmlns:mc="http://schemas.openxmlformats.org/markup-compatibility/2006">
               <mc:Choice xmlns:v="urn:schemas-microsoft-com:vml" Requires="v">
-                <p:oleObj spid="_x0000_s11400" name="Equation" r:id="rId4" imgW="114120" imgH="177480" progId="Equation.DSMT4">
+                <p:oleObj spid="_x0000_s11407" name="Equation" r:id="rId4" imgW="114120" imgH="177480" progId="Equation.DSMT4">
                   <p:embed/>
                 </p:oleObj>
               </mc:Choice>
@@ -21976,7 +21939,7 @@
           <a:graphicData uri="http://schemas.openxmlformats.org/presentationml/2006/ole">
             <mc:AlternateContent xmlns:mc="http://schemas.openxmlformats.org/markup-compatibility/2006">
               <mc:Choice xmlns:v="urn:schemas-microsoft-com:vml" Requires="v">
-                <p:oleObj spid="_x0000_s11401" name="Equation" r:id="rId6" imgW="114120" imgH="177480" progId="Equation.DSMT4">
+                <p:oleObj spid="_x0000_s11408" name="Equation" r:id="rId6" imgW="114120" imgH="177480" progId="Equation.DSMT4">
                   <p:embed/>
                 </p:oleObj>
               </mc:Choice>
@@ -22812,7 +22775,7 @@
           <a:graphicData uri="http://schemas.openxmlformats.org/presentationml/2006/ole">
             <mc:AlternateContent xmlns:mc="http://schemas.openxmlformats.org/markup-compatibility/2006">
               <mc:Choice xmlns:v="urn:schemas-microsoft-com:vml" Requires="v">
-                <p:oleObj spid="_x0000_s140428" name="Equation" r:id="rId4" imgW="914400" imgH="215640" progId="Equation.3">
+                <p:oleObj spid="_x0000_s140435" name="Equation" r:id="rId4" imgW="914400" imgH="215640" progId="Equation.3">
                   <p:embed/>
                 </p:oleObj>
               </mc:Choice>
@@ -22882,7 +22845,7 @@
           <a:graphicData uri="http://schemas.openxmlformats.org/presentationml/2006/ole">
             <mc:AlternateContent xmlns:mc="http://schemas.openxmlformats.org/markup-compatibility/2006">
               <mc:Choice xmlns:v="urn:schemas-microsoft-com:vml" Requires="v">
-                <p:oleObj spid="_x0000_s140429" name="Equation" r:id="rId6" imgW="914400" imgH="215640" progId="Equation.3">
+                <p:oleObj spid="_x0000_s140436" name="Equation" r:id="rId6" imgW="914400" imgH="215640" progId="Equation.3">
                   <p:embed/>
                 </p:oleObj>
               </mc:Choice>
@@ -23536,7 +23499,7 @@
           <a:graphicData uri="http://schemas.openxmlformats.org/presentationml/2006/ole">
             <mc:AlternateContent xmlns:mc="http://schemas.openxmlformats.org/markup-compatibility/2006">
               <mc:Choice xmlns:v="urn:schemas-microsoft-com:vml" Requires="v">
-                <p:oleObj spid="_x0000_s184398" name="Equation" r:id="rId4" imgW="2552700" imgH="419100" progId="Equation.DSMT4">
+                <p:oleObj spid="_x0000_s184402" name="Equation" r:id="rId4" imgW="2552700" imgH="419100" progId="Equation.DSMT4">
                   <p:embed/>
                 </p:oleObj>
               </mc:Choice>
@@ -23688,13 +23651,7 @@
               <a:rPr lang="en-US" sz="3600" dirty="0" smtClean="0">
                 <a:latin typeface="Comic Sans MS" pitchFamily="66" charset="0"/>
               </a:rPr>
-              <a:t>    </a:t>
-            </a:r>
-            <a:r>
-              <a:rPr lang="en-US" sz="3600" dirty="0" smtClean="0">
-                <a:latin typeface="Comic Sans MS" pitchFamily="66" charset="0"/>
-              </a:rPr>
-              <a:t>substitute </a:t>
+              <a:t>    substitute </a:t>
             </a:r>
             <a:r>
               <a:rPr lang="en-US" sz="3600" dirty="0">
@@ -24226,7 +24183,7 @@
           <a:graphicData uri="http://schemas.openxmlformats.org/presentationml/2006/ole">
             <mc:AlternateContent xmlns:mc="http://schemas.openxmlformats.org/markup-compatibility/2006">
               <mc:Choice xmlns:v="urn:schemas-microsoft-com:vml" Requires="v">
-                <p:oleObj spid="_x0000_s12367" name="Equation" r:id="rId4" imgW="2590560" imgH="368280" progId="Equation.DSMT4">
+                <p:oleObj spid="_x0000_s12371" name="Equation" r:id="rId4" imgW="2590560" imgH="368280" progId="Equation.DSMT4">
                   <p:embed/>
                 </p:oleObj>
               </mc:Choice>
@@ -25117,7 +25074,7 @@
           <a:graphicData uri="http://schemas.openxmlformats.org/presentationml/2006/ole">
             <mc:AlternateContent xmlns:mc="http://schemas.openxmlformats.org/markup-compatibility/2006">
               <mc:Choice xmlns:v="urn:schemas-microsoft-com:vml" Requires="v">
-                <p:oleObj spid="_x0000_s13391" name="Equation" r:id="rId4" imgW="152280" imgH="393480" progId="Equation.DSMT4">
+                <p:oleObj spid="_x0000_s13395" name="Equation" r:id="rId4" imgW="152280" imgH="393480" progId="Equation.DSMT4">
                   <p:embed/>
                 </p:oleObj>
               </mc:Choice>
@@ -25954,7 +25911,7 @@
           <a:graphicData uri="http://schemas.openxmlformats.org/presentationml/2006/ole">
             <mc:AlternateContent xmlns:mc="http://schemas.openxmlformats.org/markup-compatibility/2006">
               <mc:Choice xmlns:v="urn:schemas-microsoft-com:vml" Requires="v">
-                <p:oleObj spid="_x0000_s2193" name="Equation" r:id="rId4" imgW="914400" imgH="215640" progId="Equation.3">
+                <p:oleObj spid="_x0000_s2200" name="Equation" r:id="rId4" imgW="914400" imgH="215640" progId="Equation.3">
                   <p:embed/>
                 </p:oleObj>
               </mc:Choice>
@@ -26024,7 +25981,7 @@
           <a:graphicData uri="http://schemas.openxmlformats.org/presentationml/2006/ole">
             <mc:AlternateContent xmlns:mc="http://schemas.openxmlformats.org/markup-compatibility/2006">
               <mc:Choice xmlns:v="urn:schemas-microsoft-com:vml" Requires="v">
-                <p:oleObj spid="_x0000_s2194" name="Equation" r:id="rId6" imgW="914400" imgH="215640" progId="Equation.3">
+                <p:oleObj spid="_x0000_s2201" name="Equation" r:id="rId6" imgW="914400" imgH="215640" progId="Equation.3">
                   <p:embed/>
                 </p:oleObj>
               </mc:Choice>
@@ -27599,7 +27556,7 @@
           <a:graphicData uri="http://schemas.openxmlformats.org/presentationml/2006/ole">
             <mc:AlternateContent xmlns:mc="http://schemas.openxmlformats.org/markup-compatibility/2006">
               <mc:Choice xmlns:v="urn:schemas-microsoft-com:vml" Requires="v">
-                <p:oleObj spid="_x0000_s3207" name="Equation" r:id="rId4" imgW="914400" imgH="215640" progId="Equation.3">
+                <p:oleObj spid="_x0000_s3211" name="Equation" r:id="rId4" imgW="914400" imgH="215640" progId="Equation.3">
                   <p:embed/>
                 </p:oleObj>
               </mc:Choice>

</xml_diff>